<commit_message>
JavaScript UI hw 1,2 README's
</commit_message>
<xml_diff>
--- a/8. JavaScript UI & DOM/Lectures/02. Canvas.pptx
+++ b/8. JavaScript UI & DOM/Lectures/02. Canvas.pptx
@@ -49,21 +49,26 @@
     <p:sldId id="298" r:id="rId43"/>
     <p:sldId id="299" r:id="rId44"/>
     <p:sldId id="300" r:id="rId45"/>
-    <p:sldId id="301" r:id="rId46"/>
-    <p:sldId id="302" r:id="rId47"/>
-    <p:sldId id="303" r:id="rId48"/>
-    <p:sldId id="304" r:id="rId49"/>
-    <p:sldId id="306" r:id="rId50"/>
-    <p:sldId id="305" r:id="rId51"/>
-    <p:sldId id="307" r:id="rId52"/>
-    <p:sldId id="308" r:id="rId53"/>
-    <p:sldId id="309" r:id="rId54"/>
-    <p:sldId id="310" r:id="rId55"/>
-    <p:sldId id="311" r:id="rId56"/>
-    <p:sldId id="295" r:id="rId57"/>
-    <p:sldId id="312" r:id="rId58"/>
-    <p:sldId id="313" r:id="rId59"/>
-    <p:sldId id="314" r:id="rId60"/>
+    <p:sldId id="316" r:id="rId46"/>
+    <p:sldId id="318" r:id="rId47"/>
+    <p:sldId id="319" r:id="rId48"/>
+    <p:sldId id="320" r:id="rId49"/>
+    <p:sldId id="317" r:id="rId50"/>
+    <p:sldId id="301" r:id="rId51"/>
+    <p:sldId id="302" r:id="rId52"/>
+    <p:sldId id="303" r:id="rId53"/>
+    <p:sldId id="304" r:id="rId54"/>
+    <p:sldId id="306" r:id="rId55"/>
+    <p:sldId id="305" r:id="rId56"/>
+    <p:sldId id="307" r:id="rId57"/>
+    <p:sldId id="308" r:id="rId58"/>
+    <p:sldId id="309" r:id="rId59"/>
+    <p:sldId id="310" r:id="rId60"/>
+    <p:sldId id="311" r:id="rId61"/>
+    <p:sldId id="295" r:id="rId62"/>
+    <p:sldId id="312" r:id="rId63"/>
+    <p:sldId id="313" r:id="rId64"/>
+    <p:sldId id="314" r:id="rId65"/>
   </p:sldIdLst>
   <p:sldSz cx="9144000" cy="6858000" type="screen4x3"/>
   <p:notesSz cx="6858000" cy="9144000"/>
@@ -6750,7 +6755,7 @@
             </a:r>
             <a:r>
               <a:rPr lang="en-US" dirty="0" smtClean="0"/>
-              <a:t>("the-canvas");</a:t>
+              <a:t>('the-canvas');</a:t>
             </a:r>
           </a:p>
           <a:p>
@@ -6776,7 +6781,7 @@
             </a:r>
             <a:r>
               <a:rPr lang="en-US" dirty="0" smtClean="0"/>
-              <a:t>("2d");</a:t>
+              <a:t>('2d');</a:t>
             </a:r>
           </a:p>
           <a:p>
@@ -6851,6 +6856,13 @@
   <p:clrMapOvr>
     <a:masterClrMapping/>
   </p:clrMapOvr>
+  <p:timing>
+    <p:tnLst>
+      <p:par>
+        <p:cTn id="1" dur="indefinite" restart="never" nodeType="tmRoot"/>
+      </p:par>
+    </p:tnLst>
+  </p:timing>
 </p:sld>
 </file>
 
@@ -7090,6 +7102,13 @@
   <p:clrMapOvr>
     <a:masterClrMapping/>
   </p:clrMapOvr>
+  <p:timing>
+    <p:tnLst>
+      <p:par>
+        <p:cTn id="1" dur="indefinite" restart="never" nodeType="tmRoot"/>
+      </p:par>
+    </p:tnLst>
+  </p:timing>
 </p:sld>
 </file>
 
@@ -7480,7 +7499,7 @@
             </a:r>
             <a:r>
               <a:rPr lang="en-US" dirty="0" smtClean="0"/>
-              <a:t>("rects-canvas"),</a:t>
+              <a:t>('rects-canvas'),</a:t>
             </a:r>
           </a:p>
           <a:p>
@@ -7506,7 +7525,7 @@
             </a:r>
             <a:r>
               <a:rPr lang="en-US" dirty="0" smtClean="0"/>
-              <a:t>("2d");</a:t>
+              <a:t>('2d');</a:t>
             </a:r>
             <a:endParaRPr lang="bg-BG" dirty="0" smtClean="0"/>
           </a:p>
@@ -7534,16 +7553,29 @@
             </a:r>
             <a:r>
               <a:rPr lang="en-US" dirty="0"/>
-              <a:t>= "</a:t>
-            </a:r>
-            <a:r>
-              <a:rPr lang="en-US" dirty="0" err="1"/>
+              <a:t>= </a:t>
+            </a:r>
+            <a:r>
+              <a:rPr lang="en-US" dirty="0" smtClean="0"/>
+              <a:t>'</a:t>
+            </a:r>
+            <a:r>
+              <a:rPr lang="en-US" dirty="0" err="1" smtClean="0"/>
               <a:t>rgb</a:t>
             </a:r>
             <a:r>
+              <a:rPr lang="en-US" dirty="0" smtClean="0"/>
+              <a:t>(107</a:t>
+            </a:r>
+            <a:r>
               <a:rPr lang="en-US" dirty="0"/>
-              <a:t>(107, 187, 201)";</a:t>
-            </a:r>
+              <a:t>, 187, 201</a:t>
+            </a:r>
+            <a:r>
+              <a:rPr lang="en-US" dirty="0" smtClean="0"/>
+              <a:t>)';</a:t>
+            </a:r>
+            <a:endParaRPr lang="en-US" dirty="0"/>
           </a:p>
           <a:p>
             <a:r>
@@ -7560,15 +7592,27 @@
             </a:r>
             <a:r>
               <a:rPr lang="en-US" dirty="0"/>
-              <a:t>= "</a:t>
-            </a:r>
-            <a:r>
-              <a:rPr lang="en-US" dirty="0" err="1"/>
+              <a:t>= </a:t>
+            </a:r>
+            <a:r>
+              <a:rPr lang="en-US" dirty="0" smtClean="0"/>
+              <a:t>'</a:t>
+            </a:r>
+            <a:r>
+              <a:rPr lang="en-US" dirty="0" err="1" smtClean="0"/>
               <a:t>rgb</a:t>
             </a:r>
             <a:r>
+              <a:rPr lang="en-US" dirty="0" smtClean="0"/>
+              <a:t>(2</a:t>
+            </a:r>
+            <a:r>
               <a:rPr lang="en-US" dirty="0"/>
-              <a:t>(2, 55, 155)";</a:t>
+              <a:t>, 55, 155</a:t>
+            </a:r>
+            <a:r>
+              <a:rPr lang="en-US" dirty="0" smtClean="0"/>
+              <a:t>)';</a:t>
             </a:r>
             <a:endParaRPr lang="bg-BG" dirty="0" smtClean="0"/>
           </a:p>
@@ -7623,6 +7667,13 @@
   <p:clrMapOvr>
     <a:masterClrMapping/>
   </p:clrMapOvr>
+  <p:timing>
+    <p:tnLst>
+      <p:par>
+        <p:cTn id="1" dur="indefinite" restart="never" nodeType="tmRoot"/>
+      </p:par>
+    </p:tnLst>
+  </p:timing>
 </p:sld>
 </file>
 
@@ -7699,6 +7750,13 @@
   <p:clrMapOvr>
     <a:masterClrMapping/>
   </p:clrMapOvr>
+  <p:timing>
+    <p:tnLst>
+      <p:par>
+        <p:cTn id="1" dur="indefinite" restart="never" nodeType="tmRoot"/>
+      </p:par>
+    </p:tnLst>
+  </p:timing>
 </p:sld>
 </file>
 
@@ -7771,6 +7829,13 @@
   <p:clrMapOvr>
     <a:masterClrMapping/>
   </p:clrMapOvr>
+  <p:timing>
+    <p:tnLst>
+      <p:par>
+        <p:cTn id="1" dur="indefinite" restart="never" nodeType="tmRoot"/>
+      </p:par>
+    </p:tnLst>
+  </p:timing>
 </p:sld>
 </file>
 
@@ -7875,6 +7940,13 @@
   <p:clrMapOvr>
     <a:masterClrMapping/>
   </p:clrMapOvr>
+  <p:timing>
+    <p:tnLst>
+      <p:par>
+        <p:cTn id="1" dur="indefinite" restart="never" nodeType="tmRoot"/>
+      </p:par>
+    </p:tnLst>
+  </p:timing>
 </p:sld>
 </file>
 
@@ -9366,10 +9438,19 @@
           </a:p>
           <a:p>
             <a:r>
+              <a:rPr lang="en-US" dirty="0"/>
+              <a:t>Drawing </a:t>
+            </a:r>
+            <a:r>
+              <a:rPr lang="en-US" dirty="0" smtClean="0"/>
+              <a:t>Text</a:t>
+            </a:r>
+          </a:p>
+          <a:p>
+            <a:r>
               <a:rPr lang="en-US" dirty="0" smtClean="0"/>
               <a:t>Per-pixel manipulations</a:t>
             </a:r>
-            <a:endParaRPr lang="en-US" dirty="0"/>
           </a:p>
         </p:txBody>
       </p:sp>
@@ -17646,6 +17727,13 @@
   <p:clrMapOvr>
     <a:masterClrMapping/>
   </p:clrMapOvr>
+  <p:timing>
+    <p:tnLst>
+      <p:par>
+        <p:cTn id="1" dur="indefinite" restart="never" nodeType="tmRoot"/>
+      </p:par>
+    </p:tnLst>
+  </p:timing>
 </p:sld>
 </file>
 
@@ -18150,14 +18238,26 @@
             <a:pPr marL="182880"/>
             <a:r>
               <a:rPr lang="en-US" sz="2000" dirty="0" smtClean="0"/>
-              <a:t>0 degrees == 0 radians</a:t>
+              <a:t>  0 </a:t>
+            </a:r>
+            <a:r>
+              <a:rPr lang="en-US" sz="2000" dirty="0" smtClean="0"/>
+              <a:t>degrees == </a:t>
+            </a:r>
+            <a:r>
+              <a:rPr lang="en-US" sz="2000" dirty="0" smtClean="0"/>
+              <a:t>0.0*PI </a:t>
+            </a:r>
+            <a:r>
+              <a:rPr lang="en-US" sz="2000" dirty="0" smtClean="0"/>
+              <a:t>radians</a:t>
             </a:r>
           </a:p>
           <a:p>
             <a:pPr marL="182880"/>
             <a:r>
               <a:rPr lang="en-US" sz="2000" dirty="0" smtClean="0"/>
-              <a:t>90 </a:t>
+              <a:t> 90 </a:t>
             </a:r>
             <a:r>
               <a:rPr lang="en-US" sz="2000" dirty="0" err="1" smtClean="0"/>
@@ -18165,18 +18265,26 @@
             </a:r>
             <a:r>
               <a:rPr lang="en-US" sz="2000" dirty="0" smtClean="0"/>
-              <a:t> == PI/2 radians</a:t>
+              <a:t> == </a:t>
+            </a:r>
+            <a:r>
+              <a:rPr lang="en-US" sz="2000" dirty="0" smtClean="0"/>
+              <a:t>0.5*PI </a:t>
+            </a:r>
+            <a:r>
+              <a:rPr lang="en-US" sz="2000" dirty="0" smtClean="0"/>
+              <a:t>radians</a:t>
             </a:r>
           </a:p>
           <a:p>
             <a:pPr marL="182880"/>
             <a:r>
               <a:rPr lang="en-US" sz="2000" dirty="0" smtClean="0"/>
-              <a:t>180 degrees == PI </a:t>
-            </a:r>
-            <a:r>
-              <a:rPr lang="en-US" sz="2000" dirty="0" err="1" smtClean="0"/>
-              <a:t>radiauns</a:t>
+              <a:t>180 degrees == </a:t>
+            </a:r>
+            <a:r>
+              <a:rPr lang="en-US" sz="2000" dirty="0" smtClean="0"/>
+              <a:t>1.0*PI radians</a:t>
             </a:r>
             <a:endParaRPr lang="en-US" sz="2000" dirty="0" smtClean="0"/>
           </a:p>
@@ -18184,14 +18292,30 @@
             <a:pPr marL="182880"/>
             <a:r>
               <a:rPr lang="en-US" sz="2000" dirty="0" smtClean="0"/>
-              <a:t>270 degrees == 3*PI/2 radians</a:t>
+              <a:t>270 degrees == </a:t>
+            </a:r>
+            <a:r>
+              <a:rPr lang="en-US" sz="2000" dirty="0" smtClean="0"/>
+              <a:t>1.5*PI </a:t>
+            </a:r>
+            <a:r>
+              <a:rPr lang="en-US" sz="2000" dirty="0" smtClean="0"/>
+              <a:t>radians</a:t>
             </a:r>
           </a:p>
           <a:p>
             <a:pPr marL="182880"/>
             <a:r>
               <a:rPr lang="en-US" sz="2000" dirty="0" smtClean="0"/>
-              <a:t>360 degrees == 2*PI radians</a:t>
+              <a:t>360 degrees == </a:t>
+            </a:r>
+            <a:r>
+              <a:rPr lang="en-US" sz="2000" dirty="0" smtClean="0"/>
+              <a:t>2.0*PI </a:t>
+            </a:r>
+            <a:r>
+              <a:rPr lang="en-US" sz="2000" dirty="0" smtClean="0"/>
+              <a:t>radians</a:t>
             </a:r>
             <a:endParaRPr lang="en-US" sz="2000" dirty="0"/>
           </a:p>
@@ -19141,7 +19265,7 @@
               <a:buSzPct val="70000"/>
             </a:pPr>
             <a:r>
-              <a:rPr lang="en-US" sz="2000" b="1" dirty="0">
+              <a:rPr lang="en-US" sz="2000" b="1" dirty="0" smtClean="0">
                 <a:solidFill>
                   <a:schemeClr val="tx1">
                     <a:lumMod val="20000"/>
@@ -19158,7 +19282,7 @@
                 <a:latin typeface="Consolas" pitchFamily="49" charset="0"/>
                 <a:cs typeface="Consolas" pitchFamily="49" charset="0"/>
               </a:rPr>
-              <a:t>PI/2</a:t>
+              <a:t>0.5*PI</a:t>
             </a:r>
             <a:r>
               <a:rPr lang="en-US" sz="2000" b="1" dirty="0">
@@ -19175,7 +19299,7 @@
                 <a:latin typeface="Consolas" pitchFamily="49" charset="0"/>
                 <a:cs typeface="Consolas" pitchFamily="49" charset="0"/>
               </a:rPr>
-              <a:t> </a:t>
+              <a:t/>
             </a:r>
             <a:br>
               <a:rPr lang="en-US" sz="2000" b="1" dirty="0">
@@ -19361,7 +19485,7 @@
               <a:buSzPct val="70000"/>
             </a:pPr>
             <a:r>
-              <a:rPr lang="en-US" sz="2000" b="1" dirty="0">
+              <a:rPr lang="en-US" sz="2000" b="1" dirty="0" smtClean="0">
                 <a:solidFill>
                   <a:schemeClr val="tx1">
                     <a:lumMod val="20000"/>
@@ -19378,12 +19502,15 @@
                 <a:latin typeface="Consolas" pitchFamily="49" charset="0"/>
                 <a:cs typeface="Consolas" pitchFamily="49" charset="0"/>
               </a:rPr>
-              <a:t>3*PI/2</a:t>
-            </a:r>
-            <a:r>
-              <a:rPr lang="en-US" sz="2000" b="1" dirty="0">
-                <a:solidFill>
-                  <a:srgbClr val="8CF4F2"/>
+              <a:t>1.5</a:t>
+            </a:r>
+            <a:r>
+              <a:rPr lang="en-US" sz="2000" b="1" dirty="0" smtClean="0">
+                <a:solidFill>
+                  <a:schemeClr val="tx1">
+                    <a:lumMod val="20000"/>
+                    <a:lumOff val="80000"/>
+                  </a:schemeClr>
                 </a:solidFill>
                 <a:effectLst>
                   <a:outerShdw blurRad="38100" dist="38100" dir="2700000" algn="tl">
@@ -19395,7 +19522,24 @@
                 <a:latin typeface="Consolas" pitchFamily="49" charset="0"/>
                 <a:cs typeface="Consolas" pitchFamily="49" charset="0"/>
               </a:rPr>
-              <a:t> </a:t>
+              <a:t>*PI</a:t>
+            </a:r>
+            <a:r>
+              <a:rPr lang="en-US" sz="2000" b="1" dirty="0">
+                <a:solidFill>
+                  <a:srgbClr val="8CF4F2"/>
+                </a:solidFill>
+                <a:effectLst>
+                  <a:outerShdw blurRad="38100" dist="38100" dir="2700000" algn="tl">
+                    <a:srgbClr val="000000">
+                      <a:alpha val="43137"/>
+                    </a:srgbClr>
+                  </a:outerShdw>
+                </a:effectLst>
+                <a:latin typeface="Consolas" pitchFamily="49" charset="0"/>
+                <a:cs typeface="Consolas" pitchFamily="49" charset="0"/>
+              </a:rPr>
+              <a:t/>
             </a:r>
             <a:br>
               <a:rPr lang="en-US" sz="2000" b="1" dirty="0">
@@ -19569,7 +19713,7 @@
               <a:buNone/>
             </a:pPr>
             <a:r>
-              <a:rPr lang="en-US" sz="2000" b="1" dirty="0">
+              <a:rPr lang="en-US" sz="2000" b="1" smtClean="0">
                 <a:solidFill>
                   <a:schemeClr val="tx1">
                     <a:lumMod val="20000"/>
@@ -22129,6 +22273,13 @@
   <p:clrMapOvr>
     <a:masterClrMapping/>
   </p:clrMapOvr>
+  <p:timing>
+    <p:tnLst>
+      <p:par>
+        <p:cTn id="1" dur="indefinite" restart="never" nodeType="tmRoot"/>
+      </p:par>
+    </p:tnLst>
+  </p:timing>
 </p:sld>
 </file>
 
@@ -22386,7 +22537,7 @@
                   </a:schemeClr>
                 </a:solidFill>
               </a:rPr>
-              <a:t>context.quadraticCurve</a:t>
+              <a:t>context.quadraticCurveTo</a:t>
             </a:r>
             <a:r>
               <a:rPr lang="en-US" dirty="0" smtClean="0">
@@ -22639,10 +22790,10 @@
                   </a:schemeClr>
                 </a:solidFill>
               </a:rPr>
-              <a:t>(ex, </a:t>
-            </a:r>
-            <a:r>
-              <a:rPr lang="en-US" dirty="0" err="1" smtClean="0">
+              <a:t>(cx</a:t>
+            </a:r>
+            <a:r>
+              <a:rPr lang="en-US" baseline="-25000" dirty="0" smtClean="0">
                 <a:solidFill>
                   <a:schemeClr val="accent5">
                     <a:lumMod val="20000"/>
@@ -22650,7 +22801,7 @@
                   </a:schemeClr>
                 </a:solidFill>
               </a:rPr>
-              <a:t>ey</a:t>
+              <a:t>1</a:t>
             </a:r>
             <a:r>
               <a:rPr lang="en-US" dirty="0" smtClean="0">
@@ -22661,7 +22812,7 @@
                   </a:schemeClr>
                 </a:solidFill>
               </a:rPr>
-              <a:t>, cx</a:t>
+              <a:t>, cy</a:t>
             </a:r>
             <a:r>
               <a:rPr lang="en-US" baseline="-25000" dirty="0" smtClean="0">
@@ -22683,7 +22834,7 @@
                   </a:schemeClr>
                 </a:solidFill>
               </a:rPr>
-              <a:t>, cy</a:t>
+              <a:t>, cx</a:t>
             </a:r>
             <a:r>
               <a:rPr lang="en-US" baseline="-25000" dirty="0" smtClean="0">
@@ -22694,7 +22845,7 @@
                   </a:schemeClr>
                 </a:solidFill>
               </a:rPr>
-              <a:t>1</a:t>
+              <a:t>2</a:t>
             </a:r>
             <a:r>
               <a:rPr lang="en-US" dirty="0" smtClean="0">
@@ -22705,7 +22856,7 @@
                   </a:schemeClr>
                 </a:solidFill>
               </a:rPr>
-              <a:t>, cx</a:t>
+              <a:t>, cy</a:t>
             </a:r>
             <a:r>
               <a:rPr lang="en-US" baseline="-25000" dirty="0" smtClean="0">
@@ -22716,10 +22867,10 @@
                   </a:schemeClr>
                 </a:solidFill>
               </a:rPr>
-              <a:t>2</a:t>
-            </a:r>
-            <a:r>
-              <a:rPr lang="en-US" dirty="0" smtClean="0">
+              <a:t>2,</a:t>
+            </a:r>
+            <a:r>
+              <a:rPr lang="en-US" dirty="0">
                 <a:solidFill>
                   <a:schemeClr val="accent5">
                     <a:lumMod val="20000"/>
@@ -22727,10 +22878,10 @@
                   </a:schemeClr>
                 </a:solidFill>
               </a:rPr>
-              <a:t>, cy</a:t>
-            </a:r>
-            <a:r>
-              <a:rPr lang="en-US" baseline="-25000" dirty="0" smtClean="0">
+              <a:t> ex, </a:t>
+            </a:r>
+            <a:r>
+              <a:rPr lang="en-US" dirty="0" err="1">
                 <a:solidFill>
                   <a:schemeClr val="accent5">
                     <a:lumMod val="20000"/>
@@ -22738,10 +22889,10 @@
                   </a:schemeClr>
                 </a:solidFill>
               </a:rPr>
-              <a:t>2</a:t>
-            </a:r>
-            <a:r>
-              <a:rPr lang="en-US" dirty="0" smtClean="0">
+              <a:t>ey</a:t>
+            </a:r>
+            <a:r>
+              <a:rPr lang="en-US" dirty="0">
                 <a:solidFill>
                   <a:schemeClr val="accent5">
                     <a:lumMod val="20000"/>
@@ -22749,8 +22900,16 @@
                   </a:schemeClr>
                 </a:solidFill>
               </a:rPr>
-              <a:t>)</a:t>
-            </a:r>
+              <a:t>, )</a:t>
+            </a:r>
+            <a:endParaRPr lang="en-US" dirty="0" smtClean="0">
+              <a:solidFill>
+                <a:schemeClr val="accent5">
+                  <a:lumMod val="20000"/>
+                  <a:lumOff val="80000"/>
+                </a:schemeClr>
+              </a:solidFill>
+            </a:endParaRPr>
           </a:p>
           <a:p>
             <a:pPr lvl="1"/>
@@ -22878,6 +23037,13 @@
   <p:clrMapOvr>
     <a:masterClrMapping/>
   </p:clrMapOvr>
+  <p:timing>
+    <p:tnLst>
+      <p:par>
+        <p:cTn id="1" dur="indefinite" restart="never" nodeType="tmRoot"/>
+      </p:par>
+    </p:tnLst>
+  </p:timing>
 </p:sld>
 </file>
 
@@ -22900,7 +23066,7 @@
       </p:grpSpPr>
       <p:sp>
         <p:nvSpPr>
-          <p:cNvPr id="4" name="Title 3"/>
+          <p:cNvPr id="6" name="Title 5"/>
           <p:cNvSpPr>
             <a:spLocks noGrp="1"/>
           </p:cNvSpPr>
@@ -22915,7 +23081,7 @@
           <a:p>
             <a:r>
               <a:rPr lang="en-US" dirty="0" smtClean="0"/>
-              <a:t>Canvas Styles</a:t>
+              <a:t>Drawing Text in Canvas</a:t>
             </a:r>
             <a:endParaRPr lang="en-US" dirty="0"/>
           </a:p>
@@ -22923,7 +23089,7 @@
       </p:sp>
       <p:sp>
         <p:nvSpPr>
-          <p:cNvPr id="5" name="Subtitle 4"/>
+          <p:cNvPr id="7" name="Subtitle 6"/>
           <p:cNvSpPr>
             <a:spLocks noGrp="1"/>
           </p:cNvSpPr>
@@ -22936,20 +23102,27 @@
           <a:bodyPr/>
           <a:lstStyle/>
           <a:p>
-            <a:endParaRPr lang="en-US"/>
+            <a:endParaRPr lang="en-US" dirty="0"/>
           </a:p>
         </p:txBody>
       </p:sp>
     </p:spTree>
     <p:extLst>
       <p:ext uri="{BB962C8B-B14F-4D97-AF65-F5344CB8AC3E}">
-        <p14:creationId xmlns:p14="http://schemas.microsoft.com/office/powerpoint/2010/main" val="2095556706"/>
+        <p14:creationId xmlns:p14="http://schemas.microsoft.com/office/powerpoint/2010/main" val="3948237552"/>
       </p:ext>
     </p:extLst>
   </p:cSld>
   <p:clrMapOvr>
     <a:masterClrMapping/>
   </p:clrMapOvr>
+  <p:timing>
+    <p:tnLst>
+      <p:par>
+        <p:cTn id="1" dur="indefinite" restart="never" nodeType="tmRoot"/>
+      </p:par>
+    </p:tnLst>
+  </p:timing>
 </p:sld>
 </file>
 
@@ -22987,7 +23160,7 @@
           <a:p>
             <a:r>
               <a:rPr lang="en-US" dirty="0" smtClean="0"/>
-              <a:t>Canvas Styles</a:t>
+              <a:t>Drawing Text</a:t>
             </a:r>
             <a:endParaRPr lang="en-US" dirty="0"/>
           </a:p>
@@ -23003,67 +23176,239 @@
             <p:ph idx="1"/>
           </p:nvPr>
         </p:nvSpPr>
-        <p:spPr/>
+        <p:spPr>
+          <a:xfrm>
+            <a:off x="228600" y="816742"/>
+            <a:ext cx="8755602" cy="5791200"/>
+          </a:xfrm>
+        </p:spPr>
         <p:txBody>
           <a:bodyPr/>
           <a:lstStyle/>
           <a:p>
-            <a:r>
-              <a:rPr lang="en-US" dirty="0" smtClean="0"/>
-              <a:t>The canvas supports all kinds of styles</a:t>
-            </a:r>
-          </a:p>
-          <a:p>
-            <a:pPr lvl="1"/>
-            <a:r>
-              <a:rPr lang="en-US" dirty="0" smtClean="0"/>
-              <a:t>Styles for fill and stroke</a:t>
-            </a:r>
-          </a:p>
-          <a:p>
-            <a:pPr lvl="2"/>
-            <a:r>
-              <a:rPr lang="en-US" dirty="0" smtClean="0"/>
-              <a:t>Can be either a solid color or pattern</a:t>
-            </a:r>
-          </a:p>
-          <a:p>
-            <a:pPr lvl="1"/>
-            <a:r>
-              <a:rPr lang="en-US" dirty="0" smtClean="0"/>
-              <a:t>Styles for types of stroke</a:t>
-            </a:r>
-          </a:p>
-          <a:p>
-            <a:pPr lvl="2"/>
-            <a:r>
-              <a:rPr lang="en-US" dirty="0" smtClean="0"/>
-              <a:t>Dashed or solid</a:t>
-            </a:r>
-          </a:p>
-          <a:p>
-            <a:pPr lvl="2"/>
-            <a:r>
-              <a:rPr lang="en-US" dirty="0" smtClean="0"/>
-              <a:t>Done using kind of workaround </a:t>
-            </a:r>
-          </a:p>
-          <a:p>
-            <a:pPr lvl="1"/>
-            <a:endParaRPr lang="en-US" dirty="0" smtClean="0"/>
+            <a:pPr>
+              <a:lnSpc>
+                <a:spcPct val="100000"/>
+              </a:lnSpc>
+            </a:pPr>
+            <a:r>
+              <a:rPr lang="en-US" dirty="0" smtClean="0"/>
+              <a:t>The HTML5 canvas can also draw text:</a:t>
+            </a:r>
+          </a:p>
+          <a:p>
+            <a:pPr lvl="1">
+              <a:lnSpc>
+                <a:spcPct val="100000"/>
+              </a:lnSpc>
+            </a:pPr>
+            <a:r>
+              <a:rPr lang="en-US" dirty="0" smtClean="0"/>
+              <a:t>Methods:</a:t>
+            </a:r>
+          </a:p>
+          <a:p>
+            <a:pPr lvl="2">
+              <a:lnSpc>
+                <a:spcPct val="100000"/>
+              </a:lnSpc>
+            </a:pPr>
+            <a:r>
+              <a:rPr lang="en-US" dirty="0" err="1" smtClean="0">
+                <a:solidFill>
+                  <a:schemeClr val="accent5">
+                    <a:lumMod val="20000"/>
+                    <a:lumOff val="80000"/>
+                  </a:schemeClr>
+                </a:solidFill>
+                <a:latin typeface="Consolas" panose="020B0609020204030204" pitchFamily="49" charset="0"/>
+                <a:cs typeface="Consolas" panose="020B0609020204030204" pitchFamily="49" charset="0"/>
+              </a:rPr>
+              <a:t>context.fillText</a:t>
+            </a:r>
+            <a:r>
+              <a:rPr lang="en-US" dirty="0" smtClean="0">
+                <a:solidFill>
+                  <a:schemeClr val="accent5">
+                    <a:lumMod val="20000"/>
+                    <a:lumOff val="80000"/>
+                  </a:schemeClr>
+                </a:solidFill>
+                <a:latin typeface="Consolas" panose="020B0609020204030204" pitchFamily="49" charset="0"/>
+                <a:cs typeface="Consolas" panose="020B0609020204030204" pitchFamily="49" charset="0"/>
+              </a:rPr>
+              <a:t> (text, x, y)</a:t>
+            </a:r>
+            <a:r>
+              <a:rPr lang="en-US" dirty="0" smtClean="0"/>
+              <a:t> – fills the given text</a:t>
+            </a:r>
+          </a:p>
+          <a:p>
+            <a:pPr lvl="2">
+              <a:lnSpc>
+                <a:spcPct val="100000"/>
+              </a:lnSpc>
+            </a:pPr>
+            <a:r>
+              <a:rPr lang="en-US" dirty="0" err="1">
+                <a:solidFill>
+                  <a:schemeClr val="accent5">
+                    <a:lumMod val="20000"/>
+                    <a:lumOff val="80000"/>
+                  </a:schemeClr>
+                </a:solidFill>
+                <a:latin typeface="Consolas" panose="020B0609020204030204" pitchFamily="49" charset="0"/>
+                <a:cs typeface="Consolas" panose="020B0609020204030204" pitchFamily="49" charset="0"/>
+              </a:rPr>
+              <a:t>context.strokeText</a:t>
+            </a:r>
+            <a:r>
+              <a:rPr lang="en-US" dirty="0">
+                <a:solidFill>
+                  <a:schemeClr val="accent5">
+                    <a:lumMod val="20000"/>
+                    <a:lumOff val="80000"/>
+                  </a:schemeClr>
+                </a:solidFill>
+                <a:latin typeface="Consolas" panose="020B0609020204030204" pitchFamily="49" charset="0"/>
+                <a:cs typeface="Consolas" panose="020B0609020204030204" pitchFamily="49" charset="0"/>
+              </a:rPr>
+              <a:t> (text, x, y)</a:t>
+            </a:r>
+            <a:r>
+              <a:rPr lang="en-US" dirty="0" smtClean="0"/>
+              <a:t> – draws only the border of the text</a:t>
+            </a:r>
+          </a:p>
+          <a:p>
+            <a:pPr lvl="1">
+              <a:lnSpc>
+                <a:spcPct val="100000"/>
+              </a:lnSpc>
+            </a:pPr>
+            <a:r>
+              <a:rPr lang="en-US" dirty="0" smtClean="0"/>
+              <a:t>Properties:</a:t>
+            </a:r>
+          </a:p>
+          <a:p>
+            <a:pPr lvl="2">
+              <a:lnSpc>
+                <a:spcPct val="100000"/>
+              </a:lnSpc>
+            </a:pPr>
+            <a:r>
+              <a:rPr lang="en-US" dirty="0" err="1">
+                <a:solidFill>
+                  <a:schemeClr val="accent5">
+                    <a:lumMod val="20000"/>
+                    <a:lumOff val="80000"/>
+                  </a:schemeClr>
+                </a:solidFill>
+                <a:latin typeface="Consolas" panose="020B0609020204030204" pitchFamily="49" charset="0"/>
+                <a:cs typeface="Consolas" panose="020B0609020204030204" pitchFamily="49" charset="0"/>
+              </a:rPr>
+              <a:t>context.font</a:t>
+            </a:r>
+            <a:r>
+              <a:rPr lang="en-US" dirty="0"/>
+              <a:t> </a:t>
+            </a:r>
+            <a:r>
+              <a:rPr lang="en-US" dirty="0" smtClean="0"/>
+              <a:t>– sets the font size and font family of the text</a:t>
+            </a:r>
+            <a:endParaRPr lang="en-US" dirty="0"/>
+          </a:p>
+          <a:p>
+            <a:pPr lvl="2">
+              <a:lnSpc>
+                <a:spcPct val="100000"/>
+              </a:lnSpc>
+            </a:pPr>
+            <a:r>
+              <a:rPr lang="en-US" sz="2400" dirty="0" err="1">
+                <a:solidFill>
+                  <a:schemeClr val="accent5">
+                    <a:lumMod val="20000"/>
+                    <a:lumOff val="80000"/>
+                  </a:schemeClr>
+                </a:solidFill>
+                <a:latin typeface="Consolas" panose="020B0609020204030204" pitchFamily="49" charset="0"/>
+                <a:cs typeface="Consolas" panose="020B0609020204030204" pitchFamily="49" charset="0"/>
+              </a:rPr>
+              <a:t>context.fillStyle</a:t>
+            </a:r>
+            <a:r>
+              <a:rPr lang="en-US" dirty="0" smtClean="0"/>
+              <a:t> – the fill color of the text</a:t>
+            </a:r>
+            <a:endParaRPr lang="en-US" dirty="0"/>
+          </a:p>
+          <a:p>
+            <a:pPr lvl="2">
+              <a:lnSpc>
+                <a:spcPct val="100000"/>
+              </a:lnSpc>
+            </a:pPr>
+            <a:r>
+              <a:rPr lang="en-US" sz="2400" dirty="0" err="1">
+                <a:solidFill>
+                  <a:schemeClr val="accent5">
+                    <a:lumMod val="20000"/>
+                    <a:lumOff val="80000"/>
+                  </a:schemeClr>
+                </a:solidFill>
+                <a:latin typeface="Consolas" panose="020B0609020204030204" pitchFamily="49" charset="0"/>
+                <a:cs typeface="Consolas" panose="020B0609020204030204" pitchFamily="49" charset="0"/>
+              </a:rPr>
+              <a:t>context.strokeStyle</a:t>
+            </a:r>
+            <a:r>
+              <a:rPr lang="en-US" dirty="0" smtClean="0"/>
+              <a:t> </a:t>
+            </a:r>
+            <a:r>
+              <a:rPr lang="en-US" dirty="0"/>
+              <a:t>– </a:t>
+            </a:r>
+            <a:r>
+              <a:rPr lang="en-US" dirty="0" smtClean="0"/>
+              <a:t>the stroke </a:t>
+            </a:r>
+            <a:r>
+              <a:rPr lang="en-US" dirty="0"/>
+              <a:t>color of the text</a:t>
+            </a:r>
+          </a:p>
+          <a:p>
+            <a:pPr lvl="2">
+              <a:lnSpc>
+                <a:spcPct val="100000"/>
+              </a:lnSpc>
+            </a:pPr>
+            <a:endParaRPr lang="en-US" dirty="0"/>
           </a:p>
         </p:txBody>
       </p:sp>
     </p:spTree>
     <p:extLst>
       <p:ext uri="{BB962C8B-B14F-4D97-AF65-F5344CB8AC3E}">
-        <p14:creationId xmlns:p14="http://schemas.microsoft.com/office/powerpoint/2010/main" val="4070212695"/>
+        <p14:creationId xmlns:p14="http://schemas.microsoft.com/office/powerpoint/2010/main" val="4227562562"/>
       </p:ext>
     </p:extLst>
   </p:cSld>
   <p:clrMapOvr>
     <a:masterClrMapping/>
   </p:clrMapOvr>
+  <p:timing>
+    <p:tnLst>
+      <p:par>
+        <p:cTn id="1" dur="indefinite" restart="never" nodeType="tmRoot"/>
+      </p:par>
+    </p:tnLst>
+  </p:timing>
 </p:sld>
 </file>
 
@@ -23086,12 +23431,12 @@
       </p:grpSpPr>
       <p:sp>
         <p:nvSpPr>
-          <p:cNvPr id="4" name="Title 3"/>
+          <p:cNvPr id="2" name="Title 1"/>
           <p:cNvSpPr>
             <a:spLocks noGrp="1"/>
           </p:cNvSpPr>
           <p:nvPr>
-            <p:ph type="ctrTitle"/>
+            <p:ph type="title"/>
           </p:nvPr>
         </p:nvSpPr>
         <p:spPr/>
@@ -23101,7 +23446,7 @@
           <a:p>
             <a:r>
               <a:rPr lang="en-US" dirty="0" smtClean="0"/>
-              <a:t>Canvas Styles</a:t>
+              <a:t>Drawing Text: Example</a:t>
             </a:r>
             <a:endParaRPr lang="en-US" dirty="0"/>
           </a:p>
@@ -23109,12 +23454,443 @@
       </p:sp>
       <p:sp>
         <p:nvSpPr>
-          <p:cNvPr id="5" name="Subtitle 4"/>
+          <p:cNvPr id="4" name="Content Placeholder 3"/>
           <p:cNvSpPr>
             <a:spLocks noGrp="1"/>
           </p:cNvSpPr>
           <p:nvPr>
-            <p:ph type="subTitle" idx="1"/>
+            <p:ph idx="1"/>
+          </p:nvPr>
+        </p:nvSpPr>
+        <p:spPr>
+          <a:xfrm>
+            <a:off x="228600" y="990600"/>
+            <a:ext cx="8686800" cy="2887970"/>
+          </a:xfrm>
+        </p:spPr>
+        <p:txBody>
+          <a:bodyPr/>
+          <a:lstStyle/>
+          <a:p>
+            <a:r>
+              <a:rPr lang="en-US" dirty="0" smtClean="0"/>
+              <a:t>Draw the text 'Telerik Academy'</a:t>
+            </a:r>
+          </a:p>
+          <a:p>
+            <a:pPr lvl="1"/>
+            <a:r>
+              <a:rPr lang="en-US" sz="2800" dirty="0" smtClean="0"/>
+              <a:t>Filled with </a:t>
+            </a:r>
+            <a:r>
+              <a:rPr lang="en-US" sz="2800" dirty="0" err="1" smtClean="0">
+                <a:solidFill>
+                  <a:schemeClr val="accent5">
+                    <a:lumMod val="20000"/>
+                    <a:lumOff val="80000"/>
+                  </a:schemeClr>
+                </a:solidFill>
+              </a:rPr>
+              <a:t>yellowgreen</a:t>
+            </a:r>
+            <a:r>
+              <a:rPr lang="en-US" sz="2800" dirty="0" smtClean="0">
+                <a:solidFill>
+                  <a:schemeClr val="accent5">
+                    <a:lumMod val="20000"/>
+                    <a:lumOff val="80000"/>
+                  </a:schemeClr>
+                </a:solidFill>
+              </a:rPr>
+              <a:t> </a:t>
+            </a:r>
+            <a:r>
+              <a:rPr lang="en-US" sz="2800" dirty="0" smtClean="0"/>
+              <a:t>color, stroked with </a:t>
+            </a:r>
+            <a:r>
+              <a:rPr lang="en-US" sz="2800" dirty="0" smtClean="0">
+                <a:solidFill>
+                  <a:schemeClr val="accent5">
+                    <a:lumMod val="20000"/>
+                    <a:lumOff val="80000"/>
+                  </a:schemeClr>
+                </a:solidFill>
+              </a:rPr>
+              <a:t>dark green color</a:t>
+            </a:r>
+          </a:p>
+          <a:p>
+            <a:pPr lvl="1"/>
+            <a:r>
+              <a:rPr lang="en-US" sz="2800" dirty="0" smtClean="0"/>
+              <a:t>Font family – </a:t>
+            </a:r>
+            <a:r>
+              <a:rPr lang="en-US" sz="2800" dirty="0">
+                <a:solidFill>
+                  <a:schemeClr val="accent5">
+                    <a:lumMod val="20000"/>
+                    <a:lumOff val="80000"/>
+                  </a:schemeClr>
+                </a:solidFill>
+                <a:latin typeface="Consolas" panose="020B0609020204030204" pitchFamily="49" charset="0"/>
+                <a:cs typeface="Consolas" panose="020B0609020204030204" pitchFamily="49" charset="0"/>
+              </a:rPr>
+              <a:t>Arial</a:t>
+            </a:r>
+          </a:p>
+          <a:p>
+            <a:pPr lvl="1"/>
+            <a:r>
+              <a:rPr lang="en-US" sz="2800" dirty="0"/>
+              <a:t>Font sizes – from </a:t>
+            </a:r>
+            <a:r>
+              <a:rPr lang="en-US" sz="2800" dirty="0" smtClean="0">
+                <a:solidFill>
+                  <a:schemeClr val="accent5">
+                    <a:lumMod val="20000"/>
+                    <a:lumOff val="80000"/>
+                  </a:schemeClr>
+                </a:solidFill>
+                <a:latin typeface="Consolas" panose="020B0609020204030204" pitchFamily="49" charset="0"/>
+                <a:cs typeface="Consolas" panose="020B0609020204030204" pitchFamily="49" charset="0"/>
+              </a:rPr>
+              <a:t>28px</a:t>
+            </a:r>
+            <a:r>
+              <a:rPr lang="en-US" sz="2800" dirty="0" smtClean="0"/>
+              <a:t> </a:t>
+            </a:r>
+            <a:r>
+              <a:rPr lang="en-US" sz="2800" dirty="0"/>
+              <a:t>to </a:t>
+            </a:r>
+            <a:r>
+              <a:rPr lang="en-US" sz="2800" dirty="0">
+                <a:solidFill>
+                  <a:schemeClr val="accent5">
+                    <a:lumMod val="20000"/>
+                    <a:lumOff val="80000"/>
+                  </a:schemeClr>
+                </a:solidFill>
+                <a:latin typeface="Consolas" panose="020B0609020204030204" pitchFamily="49" charset="0"/>
+                <a:cs typeface="Consolas" panose="020B0609020204030204" pitchFamily="49" charset="0"/>
+              </a:rPr>
+              <a:t>48px</a:t>
+            </a:r>
+          </a:p>
+        </p:txBody>
+      </p:sp>
+      <p:sp>
+        <p:nvSpPr>
+          <p:cNvPr id="5" name="Text Placeholder 4"/>
+          <p:cNvSpPr>
+            <a:spLocks noGrp="1"/>
+          </p:cNvSpPr>
+          <p:nvPr>
+            <p:ph type="body" sz="quarter" idx="11"/>
+          </p:nvPr>
+        </p:nvSpPr>
+        <p:spPr>
+          <a:xfrm>
+            <a:off x="533400" y="3878570"/>
+            <a:ext cx="6107097" cy="2585323"/>
+          </a:xfrm>
+        </p:spPr>
+        <p:txBody>
+          <a:bodyPr/>
+          <a:lstStyle/>
+          <a:p>
+            <a:r>
+              <a:rPr lang="en-US" sz="1800" dirty="0" err="1"/>
+              <a:t>minFontSize</a:t>
+            </a:r>
+            <a:r>
+              <a:rPr lang="en-US" sz="1800" dirty="0"/>
+              <a:t> = '28</a:t>
+            </a:r>
+            <a:r>
+              <a:rPr lang="en-US" sz="1800" dirty="0" smtClean="0"/>
+              <a:t>'; </a:t>
+            </a:r>
+          </a:p>
+          <a:p>
+            <a:r>
+              <a:rPr lang="en-US" sz="1800" dirty="0" err="1" smtClean="0"/>
+              <a:t>currentFontSize</a:t>
+            </a:r>
+            <a:r>
+              <a:rPr lang="en-US" sz="1800" dirty="0" smtClean="0"/>
+              <a:t> </a:t>
+            </a:r>
+            <a:r>
+              <a:rPr lang="en-US" sz="1800" dirty="0"/>
+              <a:t>= 48;</a:t>
+            </a:r>
+          </a:p>
+          <a:p>
+            <a:r>
+              <a:rPr lang="en-US" sz="1800" dirty="0" smtClean="0"/>
+              <a:t>while </a:t>
+            </a:r>
+            <a:r>
+              <a:rPr lang="en-US" sz="1800" dirty="0"/>
+              <a:t>(</a:t>
+            </a:r>
+            <a:r>
+              <a:rPr lang="en-US" sz="1800" dirty="0" err="1"/>
+              <a:t>minFontSize</a:t>
+            </a:r>
+            <a:r>
+              <a:rPr lang="en-US" sz="1800" dirty="0"/>
+              <a:t> &lt;= </a:t>
+            </a:r>
+            <a:r>
+              <a:rPr lang="en-US" sz="1800" dirty="0" err="1"/>
+              <a:t>currentFontSize</a:t>
+            </a:r>
+            <a:r>
+              <a:rPr lang="en-US" sz="1800" dirty="0"/>
+              <a:t>) {</a:t>
+            </a:r>
+          </a:p>
+          <a:p>
+            <a:r>
+              <a:rPr lang="en-US" sz="1800" dirty="0" smtClean="0"/>
+              <a:t>  </a:t>
+            </a:r>
+            <a:r>
+              <a:rPr lang="en-US" sz="1800" dirty="0" err="1" smtClean="0"/>
+              <a:t>ctx.</a:t>
+            </a:r>
+            <a:r>
+              <a:rPr lang="en-US" sz="1800" dirty="0" err="1" smtClean="0">
+                <a:solidFill>
+                  <a:schemeClr val="tx1">
+                    <a:lumMod val="20000"/>
+                    <a:lumOff val="80000"/>
+                  </a:schemeClr>
+                </a:solidFill>
+              </a:rPr>
+              <a:t>font</a:t>
+            </a:r>
+            <a:r>
+              <a:rPr lang="en-US" sz="1800" dirty="0" smtClean="0"/>
+              <a:t> </a:t>
+            </a:r>
+            <a:r>
+              <a:rPr lang="en-US" sz="1800" dirty="0"/>
+              <a:t>= </a:t>
+            </a:r>
+            <a:r>
+              <a:rPr lang="en-US" sz="1800" dirty="0" err="1"/>
+              <a:t>currentFontSize</a:t>
+            </a:r>
+            <a:r>
+              <a:rPr lang="en-US" sz="1800" dirty="0"/>
+              <a:t> + '</a:t>
+            </a:r>
+            <a:r>
+              <a:rPr lang="en-US" sz="1800" dirty="0" err="1"/>
+              <a:t>px</a:t>
+            </a:r>
+            <a:r>
+              <a:rPr lang="en-US" sz="1800" dirty="0"/>
+              <a:t> ' + </a:t>
+            </a:r>
+            <a:r>
+              <a:rPr lang="en-US" sz="1800" dirty="0" smtClean="0"/>
+              <a:t>'Arial';</a:t>
+            </a:r>
+            <a:endParaRPr lang="en-US" sz="1800" dirty="0"/>
+          </a:p>
+          <a:p>
+            <a:r>
+              <a:rPr lang="en-US" sz="1800" dirty="0" smtClean="0"/>
+              <a:t>  </a:t>
+            </a:r>
+            <a:r>
+              <a:rPr lang="en-US" sz="1800" dirty="0" err="1" smtClean="0"/>
+              <a:t>ctx.</a:t>
+            </a:r>
+            <a:r>
+              <a:rPr lang="en-US" sz="1800" dirty="0" err="1" smtClean="0">
+                <a:solidFill>
+                  <a:schemeClr val="tx1">
+                    <a:lumMod val="20000"/>
+                    <a:lumOff val="80000"/>
+                  </a:schemeClr>
+                </a:solidFill>
+              </a:rPr>
+              <a:t>fillText</a:t>
+            </a:r>
+            <a:r>
+              <a:rPr lang="en-US" sz="1800" dirty="0" smtClean="0">
+                <a:solidFill>
+                  <a:schemeClr val="tx1">
+                    <a:lumMod val="20000"/>
+                    <a:lumOff val="80000"/>
+                  </a:schemeClr>
+                </a:solidFill>
+              </a:rPr>
+              <a:t>(text</a:t>
+            </a:r>
+            <a:r>
+              <a:rPr lang="en-US" sz="1800" dirty="0">
+                <a:solidFill>
+                  <a:schemeClr val="tx1">
+                    <a:lumMod val="20000"/>
+                    <a:lumOff val="80000"/>
+                  </a:schemeClr>
+                </a:solidFill>
+              </a:rPr>
+              <a:t>, x, y)</a:t>
+            </a:r>
+            <a:r>
+              <a:rPr lang="en-US" sz="1800" dirty="0"/>
+              <a:t>;</a:t>
+            </a:r>
+          </a:p>
+          <a:p>
+            <a:r>
+              <a:rPr lang="en-US" sz="1800" dirty="0" smtClean="0"/>
+              <a:t>  </a:t>
+            </a:r>
+            <a:r>
+              <a:rPr lang="en-US" sz="1800" dirty="0" err="1" smtClean="0"/>
+              <a:t>ctx.</a:t>
+            </a:r>
+            <a:r>
+              <a:rPr lang="en-US" sz="1800" dirty="0" err="1" smtClean="0">
+                <a:solidFill>
+                  <a:schemeClr val="tx1">
+                    <a:lumMod val="20000"/>
+                    <a:lumOff val="80000"/>
+                  </a:schemeClr>
+                </a:solidFill>
+              </a:rPr>
+              <a:t>strokeText</a:t>
+            </a:r>
+            <a:r>
+              <a:rPr lang="en-US" sz="1800" dirty="0" smtClean="0">
+                <a:solidFill>
+                  <a:schemeClr val="tx1">
+                    <a:lumMod val="20000"/>
+                    <a:lumOff val="80000"/>
+                  </a:schemeClr>
+                </a:solidFill>
+              </a:rPr>
+              <a:t>(text</a:t>
+            </a:r>
+            <a:r>
+              <a:rPr lang="en-US" sz="1800" dirty="0">
+                <a:solidFill>
+                  <a:schemeClr val="tx1">
+                    <a:lumMod val="20000"/>
+                    <a:lumOff val="80000"/>
+                  </a:schemeClr>
+                </a:solidFill>
+              </a:rPr>
+              <a:t>, x, y)</a:t>
+            </a:r>
+            <a:r>
+              <a:rPr lang="en-US" sz="1800" dirty="0"/>
+              <a:t>;</a:t>
+            </a:r>
+          </a:p>
+          <a:p>
+            <a:r>
+              <a:rPr lang="en-US" sz="1800" dirty="0" smtClean="0"/>
+              <a:t>  y </a:t>
+            </a:r>
+            <a:r>
+              <a:rPr lang="en-US" sz="1800" dirty="0"/>
+              <a:t>+= </a:t>
+            </a:r>
+            <a:r>
+              <a:rPr lang="en-US" sz="1800" dirty="0" err="1"/>
+              <a:t>currentFontSize</a:t>
+            </a:r>
+            <a:r>
+              <a:rPr lang="en-US" sz="1800" dirty="0"/>
+              <a:t> + offset;</a:t>
+            </a:r>
+          </a:p>
+          <a:p>
+            <a:r>
+              <a:rPr lang="en-US" sz="1800" dirty="0" smtClean="0"/>
+              <a:t>  </a:t>
+            </a:r>
+            <a:r>
+              <a:rPr lang="en-US" sz="1800" dirty="0" err="1" smtClean="0"/>
+              <a:t>currentFontSize</a:t>
+            </a:r>
+            <a:r>
+              <a:rPr lang="en-US" sz="1800" dirty="0" smtClean="0"/>
+              <a:t> </a:t>
+            </a:r>
+            <a:r>
+              <a:rPr lang="en-US" sz="1800" dirty="0"/>
+              <a:t>-= 4;</a:t>
+            </a:r>
+          </a:p>
+          <a:p>
+            <a:r>
+              <a:rPr lang="en-US" sz="1800" dirty="0" smtClean="0"/>
+              <a:t>}</a:t>
+            </a:r>
+            <a:endParaRPr lang="en-US" sz="1800" dirty="0"/>
+          </a:p>
+        </p:txBody>
+      </p:sp>
+    </p:spTree>
+    <p:extLst>
+      <p:ext uri="{BB962C8B-B14F-4D97-AF65-F5344CB8AC3E}">
+        <p14:creationId xmlns:p14="http://schemas.microsoft.com/office/powerpoint/2010/main" val="1486639664"/>
+      </p:ext>
+    </p:extLst>
+  </p:cSld>
+  <p:clrMapOvr>
+    <a:masterClrMapping/>
+  </p:clrMapOvr>
+  <p:timing>
+    <p:tnLst>
+      <p:par>
+        <p:cTn id="1" dur="indefinite" restart="never" nodeType="tmRoot"/>
+      </p:par>
+    </p:tnLst>
+  </p:timing>
+</p:sld>
+</file>
+
+<file path=ppt/slides/slide48.xml><?xml version="1.0" encoding="utf-8"?>
+<p:sld xmlns:a="http://schemas.openxmlformats.org/drawingml/2006/main" xmlns:r="http://schemas.openxmlformats.org/officeDocument/2006/relationships" xmlns:p="http://schemas.openxmlformats.org/presentationml/2006/main">
+  <p:cSld>
+    <p:spTree>
+      <p:nvGrpSpPr>
+        <p:cNvPr id="1" name=""/>
+        <p:cNvGrpSpPr/>
+        <p:nvPr/>
+      </p:nvGrpSpPr>
+      <p:grpSpPr>
+        <a:xfrm>
+          <a:off x="0" y="0"/>
+          <a:ext cx="0" cy="0"/>
+          <a:chOff x="0" y="0"/>
+          <a:chExt cx="0" cy="0"/>
+        </a:xfrm>
+      </p:grpSpPr>
+      <p:sp>
+        <p:nvSpPr>
+          <p:cNvPr id="2" name="Title 1"/>
+          <p:cNvSpPr>
+            <a:spLocks noGrp="1"/>
+          </p:cNvSpPr>
+          <p:nvPr>
+            <p:ph type="title"/>
           </p:nvPr>
         </p:nvSpPr>
         <p:spPr/>
@@ -23124,26 +23900,538 @@
           <a:p>
             <a:r>
               <a:rPr lang="en-US" dirty="0" smtClean="0"/>
-              <a:t>Live Demo</a:t>
+              <a:t>Drawing Text: Example</a:t>
             </a:r>
             <a:endParaRPr lang="en-US" dirty="0"/>
           </a:p>
         </p:txBody>
       </p:sp>
+      <p:sp>
+        <p:nvSpPr>
+          <p:cNvPr id="4" name="Content Placeholder 3"/>
+          <p:cNvSpPr>
+            <a:spLocks noGrp="1"/>
+          </p:cNvSpPr>
+          <p:nvPr>
+            <p:ph idx="1"/>
+          </p:nvPr>
+        </p:nvSpPr>
+        <p:spPr>
+          <a:xfrm>
+            <a:off x="228600" y="990600"/>
+            <a:ext cx="8686800" cy="2887970"/>
+          </a:xfrm>
+        </p:spPr>
+        <p:txBody>
+          <a:bodyPr/>
+          <a:lstStyle/>
+          <a:p>
+            <a:r>
+              <a:rPr lang="en-US" dirty="0" smtClean="0"/>
+              <a:t>Draw the text 'Telerik Academy'</a:t>
+            </a:r>
+          </a:p>
+          <a:p>
+            <a:pPr lvl="1"/>
+            <a:r>
+              <a:rPr lang="en-US" sz="2800" dirty="0" smtClean="0"/>
+              <a:t>Filled with </a:t>
+            </a:r>
+            <a:r>
+              <a:rPr lang="en-US" sz="2800" dirty="0" err="1" smtClean="0">
+                <a:solidFill>
+                  <a:schemeClr val="accent5">
+                    <a:lumMod val="20000"/>
+                    <a:lumOff val="80000"/>
+                  </a:schemeClr>
+                </a:solidFill>
+              </a:rPr>
+              <a:t>yellowgreen</a:t>
+            </a:r>
+            <a:r>
+              <a:rPr lang="en-US" sz="2800" dirty="0" smtClean="0">
+                <a:solidFill>
+                  <a:schemeClr val="accent5">
+                    <a:lumMod val="20000"/>
+                    <a:lumOff val="80000"/>
+                  </a:schemeClr>
+                </a:solidFill>
+              </a:rPr>
+              <a:t> </a:t>
+            </a:r>
+            <a:r>
+              <a:rPr lang="en-US" sz="2800" dirty="0" smtClean="0"/>
+              <a:t>color, stroked with </a:t>
+            </a:r>
+            <a:r>
+              <a:rPr lang="en-US" sz="2800" dirty="0" smtClean="0">
+                <a:solidFill>
+                  <a:schemeClr val="accent5">
+                    <a:lumMod val="20000"/>
+                    <a:lumOff val="80000"/>
+                  </a:schemeClr>
+                </a:solidFill>
+              </a:rPr>
+              <a:t>dark green color</a:t>
+            </a:r>
+          </a:p>
+          <a:p>
+            <a:pPr lvl="1"/>
+            <a:r>
+              <a:rPr lang="en-US" sz="2800" dirty="0" smtClean="0"/>
+              <a:t>Font family – </a:t>
+            </a:r>
+            <a:r>
+              <a:rPr lang="en-US" sz="2800" dirty="0">
+                <a:solidFill>
+                  <a:schemeClr val="accent5">
+                    <a:lumMod val="20000"/>
+                    <a:lumOff val="80000"/>
+                  </a:schemeClr>
+                </a:solidFill>
+                <a:latin typeface="Consolas" panose="020B0609020204030204" pitchFamily="49" charset="0"/>
+                <a:cs typeface="Consolas" panose="020B0609020204030204" pitchFamily="49" charset="0"/>
+              </a:rPr>
+              <a:t>Arial</a:t>
+            </a:r>
+          </a:p>
+          <a:p>
+            <a:pPr lvl="1"/>
+            <a:r>
+              <a:rPr lang="en-US" sz="2800" dirty="0"/>
+              <a:t>Font sizes – from </a:t>
+            </a:r>
+            <a:r>
+              <a:rPr lang="en-US" sz="2800" dirty="0" smtClean="0">
+                <a:solidFill>
+                  <a:schemeClr val="accent5">
+                    <a:lumMod val="20000"/>
+                    <a:lumOff val="80000"/>
+                  </a:schemeClr>
+                </a:solidFill>
+                <a:latin typeface="Consolas" panose="020B0609020204030204" pitchFamily="49" charset="0"/>
+                <a:cs typeface="Consolas" panose="020B0609020204030204" pitchFamily="49" charset="0"/>
+              </a:rPr>
+              <a:t>28px</a:t>
+            </a:r>
+            <a:r>
+              <a:rPr lang="en-US" sz="2800" dirty="0" smtClean="0"/>
+              <a:t> </a:t>
+            </a:r>
+            <a:r>
+              <a:rPr lang="en-US" sz="2800" dirty="0"/>
+              <a:t>to </a:t>
+            </a:r>
+            <a:r>
+              <a:rPr lang="en-US" sz="2800" dirty="0">
+                <a:solidFill>
+                  <a:schemeClr val="accent5">
+                    <a:lumMod val="20000"/>
+                    <a:lumOff val="80000"/>
+                  </a:schemeClr>
+                </a:solidFill>
+                <a:latin typeface="Consolas" panose="020B0609020204030204" pitchFamily="49" charset="0"/>
+                <a:cs typeface="Consolas" panose="020B0609020204030204" pitchFamily="49" charset="0"/>
+              </a:rPr>
+              <a:t>48px</a:t>
+            </a:r>
+          </a:p>
+        </p:txBody>
+      </p:sp>
+      <p:sp>
+        <p:nvSpPr>
+          <p:cNvPr id="5" name="Text Placeholder 4"/>
+          <p:cNvSpPr>
+            <a:spLocks noGrp="1"/>
+          </p:cNvSpPr>
+          <p:nvPr>
+            <p:ph type="body" sz="quarter" idx="11"/>
+          </p:nvPr>
+        </p:nvSpPr>
+        <p:spPr>
+          <a:xfrm>
+            <a:off x="533400" y="3878570"/>
+            <a:ext cx="6107097" cy="2585323"/>
+          </a:xfrm>
+        </p:spPr>
+        <p:txBody>
+          <a:bodyPr/>
+          <a:lstStyle/>
+          <a:p>
+            <a:r>
+              <a:rPr lang="en-US" sz="1800" dirty="0" err="1"/>
+              <a:t>minFontSize</a:t>
+            </a:r>
+            <a:r>
+              <a:rPr lang="en-US" sz="1800" dirty="0"/>
+              <a:t> = '28</a:t>
+            </a:r>
+            <a:r>
+              <a:rPr lang="en-US" sz="1800" dirty="0" smtClean="0"/>
+              <a:t>'; </a:t>
+            </a:r>
+          </a:p>
+          <a:p>
+            <a:r>
+              <a:rPr lang="en-US" sz="1800" dirty="0" err="1" smtClean="0"/>
+              <a:t>currentFontSize</a:t>
+            </a:r>
+            <a:r>
+              <a:rPr lang="en-US" sz="1800" dirty="0" smtClean="0"/>
+              <a:t> </a:t>
+            </a:r>
+            <a:r>
+              <a:rPr lang="en-US" sz="1800" dirty="0"/>
+              <a:t>= 48;</a:t>
+            </a:r>
+          </a:p>
+          <a:p>
+            <a:r>
+              <a:rPr lang="en-US" sz="1800" dirty="0" smtClean="0"/>
+              <a:t>while </a:t>
+            </a:r>
+            <a:r>
+              <a:rPr lang="en-US" sz="1800" dirty="0"/>
+              <a:t>(</a:t>
+            </a:r>
+            <a:r>
+              <a:rPr lang="en-US" sz="1800" dirty="0" err="1"/>
+              <a:t>minFontSize</a:t>
+            </a:r>
+            <a:r>
+              <a:rPr lang="en-US" sz="1800" dirty="0"/>
+              <a:t> &lt;= </a:t>
+            </a:r>
+            <a:r>
+              <a:rPr lang="en-US" sz="1800" dirty="0" err="1"/>
+              <a:t>currentFontSize</a:t>
+            </a:r>
+            <a:r>
+              <a:rPr lang="en-US" sz="1800" dirty="0"/>
+              <a:t>) {</a:t>
+            </a:r>
+          </a:p>
+          <a:p>
+            <a:r>
+              <a:rPr lang="en-US" sz="1800" dirty="0" smtClean="0"/>
+              <a:t>  </a:t>
+            </a:r>
+            <a:r>
+              <a:rPr lang="en-US" sz="1800" dirty="0" err="1" smtClean="0"/>
+              <a:t>ctx.</a:t>
+            </a:r>
+            <a:r>
+              <a:rPr lang="en-US" sz="1800" dirty="0" err="1" smtClean="0">
+                <a:solidFill>
+                  <a:schemeClr val="tx1">
+                    <a:lumMod val="20000"/>
+                    <a:lumOff val="80000"/>
+                  </a:schemeClr>
+                </a:solidFill>
+              </a:rPr>
+              <a:t>font</a:t>
+            </a:r>
+            <a:r>
+              <a:rPr lang="en-US" sz="1800" dirty="0" smtClean="0"/>
+              <a:t> </a:t>
+            </a:r>
+            <a:r>
+              <a:rPr lang="en-US" sz="1800" dirty="0"/>
+              <a:t>= </a:t>
+            </a:r>
+            <a:r>
+              <a:rPr lang="en-US" sz="1800" dirty="0" err="1"/>
+              <a:t>currentFontSize</a:t>
+            </a:r>
+            <a:r>
+              <a:rPr lang="en-US" sz="1800" dirty="0"/>
+              <a:t> + '</a:t>
+            </a:r>
+            <a:r>
+              <a:rPr lang="en-US" sz="1800" dirty="0" err="1"/>
+              <a:t>px</a:t>
+            </a:r>
+            <a:r>
+              <a:rPr lang="en-US" sz="1800" dirty="0"/>
+              <a:t> ' + </a:t>
+            </a:r>
+            <a:r>
+              <a:rPr lang="en-US" sz="1800" dirty="0" smtClean="0"/>
+              <a:t>'Arial';</a:t>
+            </a:r>
+            <a:endParaRPr lang="en-US" sz="1800" dirty="0"/>
+          </a:p>
+          <a:p>
+            <a:r>
+              <a:rPr lang="en-US" sz="1800" dirty="0" smtClean="0"/>
+              <a:t>  </a:t>
+            </a:r>
+            <a:r>
+              <a:rPr lang="en-US" sz="1800" dirty="0" err="1" smtClean="0"/>
+              <a:t>ctx.</a:t>
+            </a:r>
+            <a:r>
+              <a:rPr lang="en-US" sz="1800" dirty="0" err="1" smtClean="0">
+                <a:solidFill>
+                  <a:schemeClr val="tx1">
+                    <a:lumMod val="20000"/>
+                    <a:lumOff val="80000"/>
+                  </a:schemeClr>
+                </a:solidFill>
+              </a:rPr>
+              <a:t>fillText</a:t>
+            </a:r>
+            <a:r>
+              <a:rPr lang="en-US" sz="1800" dirty="0" smtClean="0">
+                <a:solidFill>
+                  <a:schemeClr val="tx1">
+                    <a:lumMod val="20000"/>
+                    <a:lumOff val="80000"/>
+                  </a:schemeClr>
+                </a:solidFill>
+              </a:rPr>
+              <a:t>(text</a:t>
+            </a:r>
+            <a:r>
+              <a:rPr lang="en-US" sz="1800" dirty="0">
+                <a:solidFill>
+                  <a:schemeClr val="tx1">
+                    <a:lumMod val="20000"/>
+                    <a:lumOff val="80000"/>
+                  </a:schemeClr>
+                </a:solidFill>
+              </a:rPr>
+              <a:t>, x, y)</a:t>
+            </a:r>
+            <a:r>
+              <a:rPr lang="en-US" sz="1800" dirty="0"/>
+              <a:t>;</a:t>
+            </a:r>
+          </a:p>
+          <a:p>
+            <a:r>
+              <a:rPr lang="en-US" sz="1800" dirty="0" smtClean="0"/>
+              <a:t>  </a:t>
+            </a:r>
+            <a:r>
+              <a:rPr lang="en-US" sz="1800" dirty="0" err="1" smtClean="0"/>
+              <a:t>ctx.</a:t>
+            </a:r>
+            <a:r>
+              <a:rPr lang="en-US" sz="1800" dirty="0" err="1" smtClean="0">
+                <a:solidFill>
+                  <a:schemeClr val="tx1">
+                    <a:lumMod val="20000"/>
+                    <a:lumOff val="80000"/>
+                  </a:schemeClr>
+                </a:solidFill>
+              </a:rPr>
+              <a:t>strokeText</a:t>
+            </a:r>
+            <a:r>
+              <a:rPr lang="en-US" sz="1800" dirty="0" smtClean="0">
+                <a:solidFill>
+                  <a:schemeClr val="tx1">
+                    <a:lumMod val="20000"/>
+                    <a:lumOff val="80000"/>
+                  </a:schemeClr>
+                </a:solidFill>
+              </a:rPr>
+              <a:t>(text</a:t>
+            </a:r>
+            <a:r>
+              <a:rPr lang="en-US" sz="1800" dirty="0">
+                <a:solidFill>
+                  <a:schemeClr val="tx1">
+                    <a:lumMod val="20000"/>
+                    <a:lumOff val="80000"/>
+                  </a:schemeClr>
+                </a:solidFill>
+              </a:rPr>
+              <a:t>, x, y)</a:t>
+            </a:r>
+            <a:r>
+              <a:rPr lang="en-US" sz="1800" dirty="0"/>
+              <a:t>;</a:t>
+            </a:r>
+          </a:p>
+          <a:p>
+            <a:r>
+              <a:rPr lang="en-US" sz="1800" dirty="0" smtClean="0"/>
+              <a:t>  y </a:t>
+            </a:r>
+            <a:r>
+              <a:rPr lang="en-US" sz="1800" dirty="0"/>
+              <a:t>+= </a:t>
+            </a:r>
+            <a:r>
+              <a:rPr lang="en-US" sz="1800" dirty="0" err="1"/>
+              <a:t>currentFontSize</a:t>
+            </a:r>
+            <a:r>
+              <a:rPr lang="en-US" sz="1800" dirty="0"/>
+              <a:t> + offset;</a:t>
+            </a:r>
+          </a:p>
+          <a:p>
+            <a:r>
+              <a:rPr lang="en-US" sz="1800" dirty="0" smtClean="0"/>
+              <a:t>  </a:t>
+            </a:r>
+            <a:r>
+              <a:rPr lang="en-US" sz="1800" dirty="0" err="1" smtClean="0"/>
+              <a:t>currentFontSize</a:t>
+            </a:r>
+            <a:r>
+              <a:rPr lang="en-US" sz="1800" dirty="0" smtClean="0"/>
+              <a:t> </a:t>
+            </a:r>
+            <a:r>
+              <a:rPr lang="en-US" sz="1800" dirty="0"/>
+              <a:t>-= 4;</a:t>
+            </a:r>
+          </a:p>
+          <a:p>
+            <a:r>
+              <a:rPr lang="en-US" sz="1800" dirty="0" smtClean="0"/>
+              <a:t>}</a:t>
+            </a:r>
+            <a:endParaRPr lang="en-US" sz="1800" dirty="0"/>
+          </a:p>
+        </p:txBody>
+      </p:sp>
+      <p:pic>
+        <p:nvPicPr>
+          <p:cNvPr id="6" name="Picture 5"/>
+          <p:cNvPicPr>
+            <a:picLocks noChangeAspect="1"/>
+          </p:cNvPicPr>
+          <p:nvPr/>
+        </p:nvPicPr>
+        <p:blipFill rotWithShape="1">
+          <a:blip r:embed="rId2"/>
+          <a:srcRect l="2835" t="8748" r="73945" b="62808"/>
+          <a:stretch/>
+        </p:blipFill>
+        <p:spPr>
+          <a:xfrm>
+            <a:off x="5871027" y="2316471"/>
+            <a:ext cx="2945999" cy="2255530"/>
+          </a:xfrm>
+          <a:prstGeom prst="roundRect">
+            <a:avLst>
+              <a:gd name="adj" fmla="val 2027"/>
+            </a:avLst>
+          </a:prstGeom>
+          <a:ln w="19050">
+            <a:solidFill>
+              <a:schemeClr val="tx1">
+                <a:lumMod val="50000"/>
+              </a:schemeClr>
+            </a:solidFill>
+          </a:ln>
+        </p:spPr>
+      </p:pic>
     </p:spTree>
     <p:extLst>
       <p:ext uri="{BB962C8B-B14F-4D97-AF65-F5344CB8AC3E}">
-        <p14:creationId xmlns:p14="http://schemas.microsoft.com/office/powerpoint/2010/main" val="2441819842"/>
+        <p14:creationId xmlns:p14="http://schemas.microsoft.com/office/powerpoint/2010/main" val="1755513112"/>
       </p:ext>
     </p:extLst>
   </p:cSld>
   <p:clrMapOvr>
     <a:masterClrMapping/>
   </p:clrMapOvr>
+  <p:timing>
+    <p:tnLst>
+      <p:par>
+        <p:cTn id="1" dur="indefinite" restart="never" nodeType="tmRoot">
+          <p:childTnLst>
+            <p:seq concurrent="1" nextAc="seek">
+              <p:cTn id="2" dur="indefinite" nodeType="mainSeq">
+                <p:childTnLst>
+                  <p:par>
+                    <p:cTn id="3" fill="hold">
+                      <p:stCondLst>
+                        <p:cond delay="indefinite"/>
+                        <p:cond evt="onBegin" delay="0">
+                          <p:tn val="2"/>
+                        </p:cond>
+                      </p:stCondLst>
+                      <p:childTnLst>
+                        <p:par>
+                          <p:cTn id="4" fill="hold">
+                            <p:stCondLst>
+                              <p:cond delay="0"/>
+                            </p:stCondLst>
+                            <p:childTnLst>
+                              <p:par>
+                                <p:cTn id="5" presetID="10" presetClass="entr" presetSubtype="0" fill="hold" nodeType="withEffect">
+                                  <p:stCondLst>
+                                    <p:cond delay="0"/>
+                                  </p:stCondLst>
+                                  <p:childTnLst>
+                                    <p:set>
+                                      <p:cBhvr>
+                                        <p:cTn id="6" dur="1" fill="hold">
+                                          <p:stCondLst>
+                                            <p:cond delay="0"/>
+                                          </p:stCondLst>
+                                        </p:cTn>
+                                        <p:tgtEl>
+                                          <p:spTgt spid="6"/>
+                                        </p:tgtEl>
+                                        <p:attrNameLst>
+                                          <p:attrName>style.visibility</p:attrName>
+                                        </p:attrNameLst>
+                                      </p:cBhvr>
+                                      <p:to>
+                                        <p:strVal val="visible"/>
+                                      </p:to>
+                                    </p:set>
+                                    <p:animEffect transition="in" filter="fade">
+                                      <p:cBhvr>
+                                        <p:cTn id="7" dur="500"/>
+                                        <p:tgtEl>
+                                          <p:spTgt spid="6"/>
+                                        </p:tgtEl>
+                                      </p:cBhvr>
+                                    </p:animEffect>
+                                  </p:childTnLst>
+                                </p:cTn>
+                              </p:par>
+                            </p:childTnLst>
+                          </p:cTn>
+                        </p:par>
+                      </p:childTnLst>
+                    </p:cTn>
+                  </p:par>
+                </p:childTnLst>
+              </p:cTn>
+              <p:prevCondLst>
+                <p:cond evt="onPrev" delay="0">
+                  <p:tgtEl>
+                    <p:sldTgt/>
+                  </p:tgtEl>
+                </p:cond>
+              </p:prevCondLst>
+              <p:nextCondLst>
+                <p:cond evt="onNext" delay="0">
+                  <p:tgtEl>
+                    <p:sldTgt/>
+                  </p:tgtEl>
+                </p:cond>
+              </p:nextCondLst>
+            </p:seq>
+          </p:childTnLst>
+        </p:cTn>
+      </p:par>
+    </p:tnLst>
+  </p:timing>
 </p:sld>
 </file>
 
-<file path=ppt/slides/slide48.xml><?xml version="1.0" encoding="utf-8"?>
+<file path=ppt/slides/slide49.xml><?xml version="1.0" encoding="utf-8"?>
 <p:sld xmlns:a="http://schemas.openxmlformats.org/drawingml/2006/main" xmlns:r="http://schemas.openxmlformats.org/officeDocument/2006/relationships" xmlns:p="http://schemas.openxmlformats.org/presentationml/2006/main">
   <p:cSld>
     <p:spTree>
@@ -23177,7 +24465,7 @@
           <a:p>
             <a:r>
               <a:rPr lang="en-US" dirty="0" smtClean="0"/>
-              <a:t>Transformations</a:t>
+              <a:t>Drawing Text in Canvas</a:t>
             </a:r>
             <a:endParaRPr lang="en-US" dirty="0"/>
           </a:p>
@@ -23198,6 +24486,10 @@
           <a:bodyPr/>
           <a:lstStyle/>
           <a:p>
+            <a:r>
+              <a:rPr lang="en-US" dirty="0" smtClean="0"/>
+              <a:t>Live Demo</a:t>
+            </a:r>
             <a:endParaRPr lang="en-US" dirty="0"/>
           </a:p>
         </p:txBody>
@@ -23205,297 +24497,7 @@
     </p:spTree>
     <p:extLst>
       <p:ext uri="{BB962C8B-B14F-4D97-AF65-F5344CB8AC3E}">
-        <p14:creationId xmlns:p14="http://schemas.microsoft.com/office/powerpoint/2010/main" val="1223492430"/>
-      </p:ext>
-    </p:extLst>
-  </p:cSld>
-  <p:clrMapOvr>
-    <a:masterClrMapping/>
-  </p:clrMapOvr>
-  <p:timing>
-    <p:tnLst>
-      <p:par>
-        <p:cTn id="1" dur="indefinite" restart="never" nodeType="tmRoot"/>
-      </p:par>
-    </p:tnLst>
-  </p:timing>
-</p:sld>
-</file>
-
-<file path=ppt/slides/slide49.xml><?xml version="1.0" encoding="utf-8"?>
-<p:sld xmlns:a="http://schemas.openxmlformats.org/drawingml/2006/main" xmlns:r="http://schemas.openxmlformats.org/officeDocument/2006/relationships" xmlns:p="http://schemas.openxmlformats.org/presentationml/2006/main">
-  <p:cSld>
-    <p:spTree>
-      <p:nvGrpSpPr>
-        <p:cNvPr id="1" name=""/>
-        <p:cNvGrpSpPr/>
-        <p:nvPr/>
-      </p:nvGrpSpPr>
-      <p:grpSpPr>
-        <a:xfrm>
-          <a:off x="0" y="0"/>
-          <a:ext cx="0" cy="0"/>
-          <a:chOff x="0" y="0"/>
-          <a:chExt cx="0" cy="0"/>
-        </a:xfrm>
-      </p:grpSpPr>
-      <p:sp>
-        <p:nvSpPr>
-          <p:cNvPr id="4" name="Title 3"/>
-          <p:cNvSpPr>
-            <a:spLocks noGrp="1"/>
-          </p:cNvSpPr>
-          <p:nvPr>
-            <p:ph type="title"/>
-          </p:nvPr>
-        </p:nvSpPr>
-        <p:spPr/>
-        <p:txBody>
-          <a:bodyPr/>
-          <a:lstStyle/>
-          <a:p>
-            <a:r>
-              <a:rPr lang="en-US" dirty="0" smtClean="0"/>
-              <a:t>Canvas Transformations</a:t>
-            </a:r>
-            <a:endParaRPr lang="en-US" dirty="0"/>
-          </a:p>
-        </p:txBody>
-      </p:sp>
-      <p:sp>
-        <p:nvSpPr>
-          <p:cNvPr id="5" name="Content Placeholder 4"/>
-          <p:cNvSpPr>
-            <a:spLocks noGrp="1"/>
-          </p:cNvSpPr>
-          <p:nvPr>
-            <p:ph idx="1"/>
-          </p:nvPr>
-        </p:nvSpPr>
-        <p:spPr>
-          <a:xfrm>
-            <a:off x="228600" y="1056440"/>
-            <a:ext cx="8686800" cy="5436093"/>
-          </a:xfrm>
-        </p:spPr>
-        <p:txBody>
-          <a:bodyPr/>
-          <a:lstStyle/>
-          <a:p>
-            <a:r>
-              <a:rPr lang="en-US" dirty="0" smtClean="0"/>
-              <a:t>The Canvas can do transformations</a:t>
-            </a:r>
-          </a:p>
-          <a:p>
-            <a:pPr lvl="1"/>
-            <a:r>
-              <a:rPr lang="en-US" dirty="0" smtClean="0"/>
-              <a:t>i.e. it can be rotated, scaled or transformed</a:t>
-            </a:r>
-          </a:p>
-          <a:p>
-            <a:r>
-              <a:rPr lang="en-US" dirty="0" err="1" smtClean="0">
-                <a:solidFill>
-                  <a:schemeClr val="accent5">
-                    <a:lumMod val="20000"/>
-                    <a:lumOff val="80000"/>
-                  </a:schemeClr>
-                </a:solidFill>
-              </a:rPr>
-              <a:t>context.scale</a:t>
-            </a:r>
-            <a:r>
-              <a:rPr lang="en-US" dirty="0" smtClean="0">
-                <a:solidFill>
-                  <a:schemeClr val="accent5">
-                    <a:lumMod val="20000"/>
-                    <a:lumOff val="80000"/>
-                  </a:schemeClr>
-                </a:solidFill>
-              </a:rPr>
-              <a:t>(d</a:t>
-            </a:r>
-            <a:r>
-              <a:rPr lang="en-US" baseline="-25000" dirty="0" smtClean="0">
-                <a:solidFill>
-                  <a:schemeClr val="accent5">
-                    <a:lumMod val="20000"/>
-                    <a:lumOff val="80000"/>
-                  </a:schemeClr>
-                </a:solidFill>
-              </a:rPr>
-              <a:t>x</a:t>
-            </a:r>
-            <a:r>
-              <a:rPr lang="en-US" dirty="0" smtClean="0">
-                <a:solidFill>
-                  <a:schemeClr val="accent5">
-                    <a:lumMod val="20000"/>
-                    <a:lumOff val="80000"/>
-                  </a:schemeClr>
-                </a:solidFill>
-              </a:rPr>
-              <a:t>, </a:t>
-            </a:r>
-            <a:r>
-              <a:rPr lang="en-US" dirty="0" err="1" smtClean="0">
-                <a:solidFill>
-                  <a:schemeClr val="accent5">
-                    <a:lumMod val="20000"/>
-                    <a:lumOff val="80000"/>
-                  </a:schemeClr>
-                </a:solidFill>
-              </a:rPr>
-              <a:t>d</a:t>
-            </a:r>
-            <a:r>
-              <a:rPr lang="en-US" baseline="-25000" dirty="0" err="1" smtClean="0">
-                <a:solidFill>
-                  <a:schemeClr val="accent5">
-                    <a:lumMod val="20000"/>
-                    <a:lumOff val="80000"/>
-                  </a:schemeClr>
-                </a:solidFill>
-              </a:rPr>
-              <a:t>y</a:t>
-            </a:r>
-            <a:r>
-              <a:rPr lang="en-US" dirty="0" smtClean="0">
-                <a:solidFill>
-                  <a:schemeClr val="accent5">
-                    <a:lumMod val="20000"/>
-                    <a:lumOff val="80000"/>
-                  </a:schemeClr>
-                </a:solidFill>
-              </a:rPr>
-              <a:t>)</a:t>
-            </a:r>
-            <a:r>
-              <a:rPr lang="en-US" dirty="0" smtClean="0"/>
-              <a:t> – all coordinates and points are scaled</a:t>
-            </a:r>
-          </a:p>
-          <a:p>
-            <a:pPr lvl="1"/>
-            <a:r>
-              <a:rPr lang="en-US" dirty="0" err="1" smtClean="0"/>
-              <a:t>fillRect</a:t>
-            </a:r>
-            <a:r>
-              <a:rPr lang="en-US" dirty="0" smtClean="0"/>
-              <a:t>(X, X, W, H) will draw a rectangle</a:t>
-            </a:r>
-          </a:p>
-          <a:p>
-            <a:pPr lvl="2"/>
-            <a:r>
-              <a:rPr lang="en-US" dirty="0" smtClean="0"/>
-              <a:t>At position (d</a:t>
-            </a:r>
-            <a:r>
-              <a:rPr lang="en-US" baseline="-25000" dirty="0" smtClean="0"/>
-              <a:t>x</a:t>
-            </a:r>
-            <a:r>
-              <a:rPr lang="en-US" dirty="0" smtClean="0"/>
-              <a:t> * X, </a:t>
-            </a:r>
-            <a:r>
-              <a:rPr lang="en-US" dirty="0" err="1" smtClean="0"/>
-              <a:t>d</a:t>
-            </a:r>
-            <a:r>
-              <a:rPr lang="en-US" baseline="-25000" dirty="0" err="1" smtClean="0"/>
-              <a:t>y</a:t>
-            </a:r>
-            <a:r>
-              <a:rPr lang="en-US" dirty="0" smtClean="0"/>
-              <a:t> * Y)</a:t>
-            </a:r>
-          </a:p>
-          <a:p>
-            <a:pPr lvl="2"/>
-            <a:r>
-              <a:rPr lang="en-US" dirty="0" smtClean="0"/>
-              <a:t>With width (d</a:t>
-            </a:r>
-            <a:r>
-              <a:rPr lang="en-US" baseline="-25000" dirty="0" smtClean="0"/>
-              <a:t>x</a:t>
-            </a:r>
-            <a:r>
-              <a:rPr lang="en-US" dirty="0" smtClean="0"/>
-              <a:t>* W) and height (</a:t>
-            </a:r>
-            <a:r>
-              <a:rPr lang="en-US" dirty="0" err="1" smtClean="0"/>
-              <a:t>d</a:t>
-            </a:r>
-            <a:r>
-              <a:rPr lang="en-US" baseline="-25000" dirty="0" err="1" smtClean="0"/>
-              <a:t>y</a:t>
-            </a:r>
-            <a:r>
-              <a:rPr lang="en-US" dirty="0" smtClean="0"/>
-              <a:t>* H)</a:t>
-            </a:r>
-          </a:p>
-          <a:p>
-            <a:r>
-              <a:rPr lang="en-US" dirty="0" err="1" smtClean="0">
-                <a:solidFill>
-                  <a:schemeClr val="accent5">
-                    <a:lumMod val="20000"/>
-                    <a:lumOff val="80000"/>
-                  </a:schemeClr>
-                </a:solidFill>
-              </a:rPr>
-              <a:t>context.rotate</a:t>
-            </a:r>
-            <a:r>
-              <a:rPr lang="en-US" dirty="0" smtClean="0">
-                <a:solidFill>
-                  <a:schemeClr val="accent5">
-                    <a:lumMod val="20000"/>
-                    <a:lumOff val="80000"/>
-                  </a:schemeClr>
-                </a:solidFill>
-              </a:rPr>
-              <a:t>(D)</a:t>
-            </a:r>
-            <a:r>
-              <a:rPr lang="en-US" dirty="0"/>
-              <a:t> – </a:t>
-            </a:r>
-            <a:r>
-              <a:rPr lang="en-US" dirty="0" smtClean="0"/>
-              <a:t>all </a:t>
-            </a:r>
-            <a:r>
-              <a:rPr lang="en-US" dirty="0"/>
-              <a:t>drawing is </a:t>
-            </a:r>
-            <a:r>
-              <a:rPr lang="en-US" dirty="0" smtClean="0"/>
-              <a:t>rotated </a:t>
-            </a:r>
-            <a:r>
-              <a:rPr lang="en-US" dirty="0"/>
-              <a:t>with angle D </a:t>
-            </a:r>
-            <a:r>
-              <a:rPr lang="en-US" dirty="0" smtClean="0"/>
-              <a:t>degrees</a:t>
-            </a:r>
-          </a:p>
-        </p:txBody>
-      </p:sp>
-    </p:spTree>
-    <p:extLst>
-      <p:ext uri="{BB962C8B-B14F-4D97-AF65-F5344CB8AC3E}">
-        <p14:creationId xmlns:p14="http://schemas.microsoft.com/office/powerpoint/2010/main" val="5591974"/>
+        <p14:creationId xmlns:p14="http://schemas.microsoft.com/office/powerpoint/2010/main" val="2351737405"/>
       </p:ext>
     </p:extLst>
   </p:cSld>
@@ -23639,6 +24641,13 @@
   <p:clrMapOvr>
     <a:masterClrMapping/>
   </p:clrMapOvr>
+  <p:timing>
+    <p:tnLst>
+      <p:par>
+        <p:cTn id="1" dur="indefinite" restart="never" nodeType="tmRoot"/>
+      </p:par>
+    </p:tnLst>
+  </p:timing>
 </p:sld>
 </file>
 
@@ -23661,7 +24670,7 @@
       </p:grpSpPr>
       <p:sp>
         <p:nvSpPr>
-          <p:cNvPr id="6" name="Title 5"/>
+          <p:cNvPr id="4" name="Title 3"/>
           <p:cNvSpPr>
             <a:spLocks noGrp="1"/>
           </p:cNvSpPr>
@@ -23676,30 +24685,7 @@
           <a:p>
             <a:r>
               <a:rPr lang="en-US" dirty="0" smtClean="0"/>
-              <a:t>Transformations</a:t>
-            </a:r>
-            <a:endParaRPr lang="en-US" dirty="0"/>
-          </a:p>
-        </p:txBody>
-      </p:sp>
-      <p:sp>
-        <p:nvSpPr>
-          <p:cNvPr id="7" name="Subtitle 6"/>
-          <p:cNvSpPr>
-            <a:spLocks noGrp="1"/>
-          </p:cNvSpPr>
-          <p:nvPr>
-            <p:ph type="subTitle" idx="1"/>
-          </p:nvPr>
-        </p:nvSpPr>
-        <p:spPr/>
-        <p:txBody>
-          <a:bodyPr/>
-          <a:lstStyle/>
-          <a:p>
-            <a:r>
-              <a:rPr lang="en-US" dirty="0" smtClean="0"/>
-              <a:t>Live Demo</a:t>
+              <a:t>Canvas Styles</a:t>
             </a:r>
             <a:endParaRPr lang="en-US" dirty="0"/>
           </a:p>
@@ -23708,13 +24694,20 @@
     </p:spTree>
     <p:extLst>
       <p:ext uri="{BB962C8B-B14F-4D97-AF65-F5344CB8AC3E}">
-        <p14:creationId xmlns:p14="http://schemas.microsoft.com/office/powerpoint/2010/main" val="707370501"/>
+        <p14:creationId xmlns:p14="http://schemas.microsoft.com/office/powerpoint/2010/main" val="2095556706"/>
       </p:ext>
     </p:extLst>
   </p:cSld>
   <p:clrMapOvr>
     <a:masterClrMapping/>
   </p:clrMapOvr>
+  <p:timing>
+    <p:tnLst>
+      <p:par>
+        <p:cTn id="1" dur="indefinite" restart="never" nodeType="tmRoot"/>
+      </p:par>
+    </p:tnLst>
+  </p:timing>
 </p:sld>
 </file>
 
@@ -23737,40 +24730,12 @@
       </p:grpSpPr>
       <p:sp>
         <p:nvSpPr>
-          <p:cNvPr id="2" name="Title 1"/>
+          <p:cNvPr id="4" name="Title 3"/>
           <p:cNvSpPr>
             <a:spLocks noGrp="1"/>
           </p:cNvSpPr>
           <p:nvPr>
-            <p:ph type="ctrTitle"/>
-          </p:nvPr>
-        </p:nvSpPr>
-        <p:spPr>
-          <a:xfrm>
-            <a:off x="609600" y="2133600"/>
-            <a:ext cx="7924800" cy="1295401"/>
-          </a:xfrm>
-        </p:spPr>
-        <p:txBody>
-          <a:bodyPr/>
-          <a:lstStyle/>
-          <a:p>
-            <a:r>
-              <a:rPr lang="en-US" dirty="0" smtClean="0"/>
-              <a:t>Canvas Per-pixel Manipulation</a:t>
-            </a:r>
-            <a:endParaRPr lang="en-US" dirty="0"/>
-          </a:p>
-        </p:txBody>
-      </p:sp>
-      <p:sp>
-        <p:nvSpPr>
-          <p:cNvPr id="3" name="Subtitle 2"/>
-          <p:cNvSpPr>
-            <a:spLocks noGrp="1"/>
-          </p:cNvSpPr>
-          <p:nvPr>
-            <p:ph type="subTitle" idx="1"/>
+            <p:ph type="title"/>
           </p:nvPr>
         </p:nvSpPr>
         <p:spPr/>
@@ -23778,14 +24743,88 @@
           <a:bodyPr/>
           <a:lstStyle/>
           <a:p>
-            <a:endParaRPr lang="en-US"/>
+            <a:r>
+              <a:rPr lang="en-US" dirty="0" smtClean="0"/>
+              <a:t>Canvas Styles</a:t>
+            </a:r>
+            <a:endParaRPr lang="en-US" dirty="0"/>
+          </a:p>
+        </p:txBody>
+      </p:sp>
+      <p:sp>
+        <p:nvSpPr>
+          <p:cNvPr id="5" name="Content Placeholder 4"/>
+          <p:cNvSpPr>
+            <a:spLocks noGrp="1"/>
+          </p:cNvSpPr>
+          <p:nvPr>
+            <p:ph idx="1"/>
+          </p:nvPr>
+        </p:nvSpPr>
+        <p:spPr>
+          <a:xfrm>
+            <a:off x="228600" y="1473200"/>
+            <a:ext cx="8686800" cy="5232400"/>
+          </a:xfrm>
+        </p:spPr>
+        <p:txBody>
+          <a:bodyPr/>
+          <a:lstStyle/>
+          <a:p>
+            <a:r>
+              <a:rPr lang="en-US" dirty="0" smtClean="0"/>
+              <a:t>The canvas supports two styles</a:t>
+            </a:r>
+          </a:p>
+          <a:p>
+            <a:pPr lvl="1"/>
+            <a:r>
+              <a:rPr lang="en-US" dirty="0" smtClean="0"/>
+              <a:t>Styles for fill and stroke</a:t>
+            </a:r>
+          </a:p>
+          <a:p>
+            <a:pPr lvl="2"/>
+            <a:r>
+              <a:rPr lang="en-US" dirty="0" smtClean="0"/>
+              <a:t>Can be either a solid color or pattern</a:t>
+            </a:r>
+          </a:p>
+          <a:p>
+            <a:pPr lvl="1"/>
+            <a:r>
+              <a:rPr lang="en-US" dirty="0" smtClean="0"/>
+              <a:t>Styles for types of stroke</a:t>
+            </a:r>
+          </a:p>
+          <a:p>
+            <a:pPr lvl="2"/>
+            <a:r>
+              <a:rPr lang="en-US" dirty="0" smtClean="0"/>
+              <a:t>Dashed or solid</a:t>
+            </a:r>
+          </a:p>
+          <a:p>
+            <a:pPr lvl="2"/>
+            <a:r>
+              <a:rPr lang="en-US" smtClean="0"/>
+              <a:t>Done </a:t>
+            </a:r>
+            <a:r>
+              <a:rPr lang="en-US" dirty="0" smtClean="0"/>
+              <a:t>using kind of workaround </a:t>
+            </a:r>
+          </a:p>
+          <a:p>
+            <a:pPr lvl="1"/>
+            <a:endParaRPr lang="en-US" dirty="0" smtClean="0"/>
           </a:p>
         </p:txBody>
       </p:sp>
     </p:spTree>
     <p:extLst>
       <p:ext uri="{BB962C8B-B14F-4D97-AF65-F5344CB8AC3E}">
-        <p14:creationId xmlns:p14="http://schemas.microsoft.com/office/powerpoint/2010/main" val="1414682654"/>
+        <p14:creationId xmlns:p14="http://schemas.microsoft.com/office/powerpoint/2010/main" val="4070212695"/>
       </p:ext>
     </p:extLst>
   </p:cSld>
@@ -23826,6 +24865,611 @@
             <a:spLocks noGrp="1"/>
           </p:cNvSpPr>
           <p:nvPr>
+            <p:ph type="ctrTitle"/>
+          </p:nvPr>
+        </p:nvSpPr>
+        <p:spPr/>
+        <p:txBody>
+          <a:bodyPr/>
+          <a:lstStyle/>
+          <a:p>
+            <a:r>
+              <a:rPr lang="en-US" dirty="0" smtClean="0"/>
+              <a:t>Canvas Styles</a:t>
+            </a:r>
+            <a:endParaRPr lang="en-US" dirty="0"/>
+          </a:p>
+        </p:txBody>
+      </p:sp>
+      <p:sp>
+        <p:nvSpPr>
+          <p:cNvPr id="5" name="Subtitle 4"/>
+          <p:cNvSpPr>
+            <a:spLocks noGrp="1"/>
+          </p:cNvSpPr>
+          <p:nvPr>
+            <p:ph type="subTitle" idx="1"/>
+          </p:nvPr>
+        </p:nvSpPr>
+        <p:spPr/>
+        <p:txBody>
+          <a:bodyPr/>
+          <a:lstStyle/>
+          <a:p>
+            <a:r>
+              <a:rPr lang="en-US" dirty="0" smtClean="0"/>
+              <a:t>Live Demo</a:t>
+            </a:r>
+            <a:endParaRPr lang="en-US" dirty="0"/>
+          </a:p>
+        </p:txBody>
+      </p:sp>
+    </p:spTree>
+    <p:extLst>
+      <p:ext uri="{BB962C8B-B14F-4D97-AF65-F5344CB8AC3E}">
+        <p14:creationId xmlns:p14="http://schemas.microsoft.com/office/powerpoint/2010/main" val="2441819842"/>
+      </p:ext>
+    </p:extLst>
+  </p:cSld>
+  <p:clrMapOvr>
+    <a:masterClrMapping/>
+  </p:clrMapOvr>
+</p:sld>
+</file>
+
+<file path=ppt/slides/slide53.xml><?xml version="1.0" encoding="utf-8"?>
+<p:sld xmlns:a="http://schemas.openxmlformats.org/drawingml/2006/main" xmlns:r="http://schemas.openxmlformats.org/officeDocument/2006/relationships" xmlns:p="http://schemas.openxmlformats.org/presentationml/2006/main">
+  <p:cSld>
+    <p:spTree>
+      <p:nvGrpSpPr>
+        <p:cNvPr id="1" name=""/>
+        <p:cNvGrpSpPr/>
+        <p:nvPr/>
+      </p:nvGrpSpPr>
+      <p:grpSpPr>
+        <a:xfrm>
+          <a:off x="0" y="0"/>
+          <a:ext cx="0" cy="0"/>
+          <a:chOff x="0" y="0"/>
+          <a:chExt cx="0" cy="0"/>
+        </a:xfrm>
+      </p:grpSpPr>
+      <p:sp>
+        <p:nvSpPr>
+          <p:cNvPr id="6" name="Title 5"/>
+          <p:cNvSpPr>
+            <a:spLocks noGrp="1"/>
+          </p:cNvSpPr>
+          <p:nvPr>
+            <p:ph type="ctrTitle"/>
+          </p:nvPr>
+        </p:nvSpPr>
+        <p:spPr/>
+        <p:txBody>
+          <a:bodyPr/>
+          <a:lstStyle/>
+          <a:p>
+            <a:r>
+              <a:rPr lang="en-US" dirty="0" smtClean="0"/>
+              <a:t>Transformations</a:t>
+            </a:r>
+            <a:endParaRPr lang="en-US" dirty="0"/>
+          </a:p>
+        </p:txBody>
+      </p:sp>
+      <p:sp>
+        <p:nvSpPr>
+          <p:cNvPr id="7" name="Subtitle 6"/>
+          <p:cNvSpPr>
+            <a:spLocks noGrp="1"/>
+          </p:cNvSpPr>
+          <p:nvPr>
+            <p:ph type="subTitle" idx="1"/>
+          </p:nvPr>
+        </p:nvSpPr>
+        <p:spPr/>
+        <p:txBody>
+          <a:bodyPr/>
+          <a:lstStyle/>
+          <a:p>
+            <a:endParaRPr lang="en-US" dirty="0"/>
+          </a:p>
+        </p:txBody>
+      </p:sp>
+    </p:spTree>
+    <p:extLst>
+      <p:ext uri="{BB962C8B-B14F-4D97-AF65-F5344CB8AC3E}">
+        <p14:creationId xmlns:p14="http://schemas.microsoft.com/office/powerpoint/2010/main" val="1223492430"/>
+      </p:ext>
+    </p:extLst>
+  </p:cSld>
+  <p:clrMapOvr>
+    <a:masterClrMapping/>
+  </p:clrMapOvr>
+  <p:timing>
+    <p:tnLst>
+      <p:par>
+        <p:cTn id="1" dur="indefinite" restart="never" nodeType="tmRoot"/>
+      </p:par>
+    </p:tnLst>
+  </p:timing>
+</p:sld>
+</file>
+
+<file path=ppt/slides/slide54.xml><?xml version="1.0" encoding="utf-8"?>
+<p:sld xmlns:a="http://schemas.openxmlformats.org/drawingml/2006/main" xmlns:r="http://schemas.openxmlformats.org/officeDocument/2006/relationships" xmlns:p="http://schemas.openxmlformats.org/presentationml/2006/main">
+  <p:cSld>
+    <p:spTree>
+      <p:nvGrpSpPr>
+        <p:cNvPr id="1" name=""/>
+        <p:cNvGrpSpPr/>
+        <p:nvPr/>
+      </p:nvGrpSpPr>
+      <p:grpSpPr>
+        <a:xfrm>
+          <a:off x="0" y="0"/>
+          <a:ext cx="0" cy="0"/>
+          <a:chOff x="0" y="0"/>
+          <a:chExt cx="0" cy="0"/>
+        </a:xfrm>
+      </p:grpSpPr>
+      <p:sp>
+        <p:nvSpPr>
+          <p:cNvPr id="4" name="Title 3"/>
+          <p:cNvSpPr>
+            <a:spLocks noGrp="1"/>
+          </p:cNvSpPr>
+          <p:nvPr>
+            <p:ph type="title"/>
+          </p:nvPr>
+        </p:nvSpPr>
+        <p:spPr/>
+        <p:txBody>
+          <a:bodyPr/>
+          <a:lstStyle/>
+          <a:p>
+            <a:r>
+              <a:rPr lang="en-US" dirty="0" smtClean="0"/>
+              <a:t>Canvas Transformations</a:t>
+            </a:r>
+            <a:endParaRPr lang="en-US" dirty="0"/>
+          </a:p>
+        </p:txBody>
+      </p:sp>
+      <p:sp>
+        <p:nvSpPr>
+          <p:cNvPr id="5" name="Content Placeholder 4"/>
+          <p:cNvSpPr>
+            <a:spLocks noGrp="1"/>
+          </p:cNvSpPr>
+          <p:nvPr>
+            <p:ph idx="1"/>
+          </p:nvPr>
+        </p:nvSpPr>
+        <p:spPr>
+          <a:xfrm>
+            <a:off x="228600" y="1056440"/>
+            <a:ext cx="8686800" cy="5436093"/>
+          </a:xfrm>
+        </p:spPr>
+        <p:txBody>
+          <a:bodyPr/>
+          <a:lstStyle/>
+          <a:p>
+            <a:r>
+              <a:rPr lang="en-US" dirty="0" smtClean="0"/>
+              <a:t>The Canvas can do transformations</a:t>
+            </a:r>
+          </a:p>
+          <a:p>
+            <a:pPr lvl="1"/>
+            <a:r>
+              <a:rPr lang="en-US" dirty="0" smtClean="0"/>
+              <a:t>i.e. it can be rotated, scaled or transformed</a:t>
+            </a:r>
+          </a:p>
+          <a:p>
+            <a:r>
+              <a:rPr lang="en-US" dirty="0" err="1" smtClean="0">
+                <a:solidFill>
+                  <a:schemeClr val="accent5">
+                    <a:lumMod val="20000"/>
+                    <a:lumOff val="80000"/>
+                  </a:schemeClr>
+                </a:solidFill>
+              </a:rPr>
+              <a:t>context.scale</a:t>
+            </a:r>
+            <a:r>
+              <a:rPr lang="en-US" dirty="0" smtClean="0">
+                <a:solidFill>
+                  <a:schemeClr val="accent5">
+                    <a:lumMod val="20000"/>
+                    <a:lumOff val="80000"/>
+                  </a:schemeClr>
+                </a:solidFill>
+              </a:rPr>
+              <a:t>(d</a:t>
+            </a:r>
+            <a:r>
+              <a:rPr lang="en-US" baseline="-25000" dirty="0" smtClean="0">
+                <a:solidFill>
+                  <a:schemeClr val="accent5">
+                    <a:lumMod val="20000"/>
+                    <a:lumOff val="80000"/>
+                  </a:schemeClr>
+                </a:solidFill>
+              </a:rPr>
+              <a:t>x</a:t>
+            </a:r>
+            <a:r>
+              <a:rPr lang="en-US" dirty="0" smtClean="0">
+                <a:solidFill>
+                  <a:schemeClr val="accent5">
+                    <a:lumMod val="20000"/>
+                    <a:lumOff val="80000"/>
+                  </a:schemeClr>
+                </a:solidFill>
+              </a:rPr>
+              <a:t>, </a:t>
+            </a:r>
+            <a:r>
+              <a:rPr lang="en-US" dirty="0" err="1" smtClean="0">
+                <a:solidFill>
+                  <a:schemeClr val="accent5">
+                    <a:lumMod val="20000"/>
+                    <a:lumOff val="80000"/>
+                  </a:schemeClr>
+                </a:solidFill>
+              </a:rPr>
+              <a:t>d</a:t>
+            </a:r>
+            <a:r>
+              <a:rPr lang="en-US" baseline="-25000" dirty="0" err="1" smtClean="0">
+                <a:solidFill>
+                  <a:schemeClr val="accent5">
+                    <a:lumMod val="20000"/>
+                    <a:lumOff val="80000"/>
+                  </a:schemeClr>
+                </a:solidFill>
+              </a:rPr>
+              <a:t>y</a:t>
+            </a:r>
+            <a:r>
+              <a:rPr lang="en-US" dirty="0" smtClean="0">
+                <a:solidFill>
+                  <a:schemeClr val="accent5">
+                    <a:lumMod val="20000"/>
+                    <a:lumOff val="80000"/>
+                  </a:schemeClr>
+                </a:solidFill>
+              </a:rPr>
+              <a:t>)</a:t>
+            </a:r>
+            <a:r>
+              <a:rPr lang="en-US" dirty="0" smtClean="0"/>
+              <a:t> – all coordinates and points are scaled</a:t>
+            </a:r>
+          </a:p>
+          <a:p>
+            <a:pPr lvl="1"/>
+            <a:r>
+              <a:rPr lang="en-US" dirty="0" err="1" smtClean="0"/>
+              <a:t>fillRect</a:t>
+            </a:r>
+            <a:r>
+              <a:rPr lang="en-US" dirty="0" smtClean="0"/>
+              <a:t>(X, X, W, H) will draw a rectangle</a:t>
+            </a:r>
+          </a:p>
+          <a:p>
+            <a:pPr lvl="2"/>
+            <a:r>
+              <a:rPr lang="en-US" dirty="0" smtClean="0"/>
+              <a:t>At position (d</a:t>
+            </a:r>
+            <a:r>
+              <a:rPr lang="en-US" baseline="-25000" dirty="0" smtClean="0"/>
+              <a:t>x</a:t>
+            </a:r>
+            <a:r>
+              <a:rPr lang="en-US" dirty="0" smtClean="0"/>
+              <a:t> * X, </a:t>
+            </a:r>
+            <a:r>
+              <a:rPr lang="en-US" dirty="0" err="1" smtClean="0"/>
+              <a:t>d</a:t>
+            </a:r>
+            <a:r>
+              <a:rPr lang="en-US" baseline="-25000" dirty="0" err="1" smtClean="0"/>
+              <a:t>y</a:t>
+            </a:r>
+            <a:r>
+              <a:rPr lang="en-US" dirty="0" smtClean="0"/>
+              <a:t> * Y)</a:t>
+            </a:r>
+          </a:p>
+          <a:p>
+            <a:pPr lvl="2"/>
+            <a:r>
+              <a:rPr lang="en-US" dirty="0" smtClean="0"/>
+              <a:t>With width (d</a:t>
+            </a:r>
+            <a:r>
+              <a:rPr lang="en-US" baseline="-25000" dirty="0" smtClean="0"/>
+              <a:t>x</a:t>
+            </a:r>
+            <a:r>
+              <a:rPr lang="en-US" dirty="0" smtClean="0"/>
+              <a:t>* W) and height (</a:t>
+            </a:r>
+            <a:r>
+              <a:rPr lang="en-US" dirty="0" err="1" smtClean="0"/>
+              <a:t>d</a:t>
+            </a:r>
+            <a:r>
+              <a:rPr lang="en-US" baseline="-25000" dirty="0" err="1" smtClean="0"/>
+              <a:t>y</a:t>
+            </a:r>
+            <a:r>
+              <a:rPr lang="en-US" dirty="0" smtClean="0"/>
+              <a:t>* H)</a:t>
+            </a:r>
+          </a:p>
+          <a:p>
+            <a:r>
+              <a:rPr lang="en-US" dirty="0" err="1" smtClean="0">
+                <a:solidFill>
+                  <a:schemeClr val="accent5">
+                    <a:lumMod val="20000"/>
+                    <a:lumOff val="80000"/>
+                  </a:schemeClr>
+                </a:solidFill>
+              </a:rPr>
+              <a:t>context.rotate</a:t>
+            </a:r>
+            <a:r>
+              <a:rPr lang="en-US" dirty="0" smtClean="0">
+                <a:solidFill>
+                  <a:schemeClr val="accent5">
+                    <a:lumMod val="20000"/>
+                    <a:lumOff val="80000"/>
+                  </a:schemeClr>
+                </a:solidFill>
+              </a:rPr>
+              <a:t>(D)</a:t>
+            </a:r>
+            <a:r>
+              <a:rPr lang="en-US" dirty="0"/>
+              <a:t> – </a:t>
+            </a:r>
+            <a:r>
+              <a:rPr lang="en-US" dirty="0" smtClean="0"/>
+              <a:t>all </a:t>
+            </a:r>
+            <a:r>
+              <a:rPr lang="en-US" dirty="0"/>
+              <a:t>drawing is </a:t>
+            </a:r>
+            <a:r>
+              <a:rPr lang="en-US" dirty="0" smtClean="0"/>
+              <a:t>rotated </a:t>
+            </a:r>
+            <a:r>
+              <a:rPr lang="en-US" dirty="0"/>
+              <a:t>with angle D </a:t>
+            </a:r>
+            <a:r>
+              <a:rPr lang="en-US" dirty="0" smtClean="0"/>
+              <a:t>degrees</a:t>
+            </a:r>
+          </a:p>
+        </p:txBody>
+      </p:sp>
+    </p:spTree>
+    <p:extLst>
+      <p:ext uri="{BB962C8B-B14F-4D97-AF65-F5344CB8AC3E}">
+        <p14:creationId xmlns:p14="http://schemas.microsoft.com/office/powerpoint/2010/main" val="5591974"/>
+      </p:ext>
+    </p:extLst>
+  </p:cSld>
+  <p:clrMapOvr>
+    <a:masterClrMapping/>
+  </p:clrMapOvr>
+  <p:timing>
+    <p:tnLst>
+      <p:par>
+        <p:cTn id="1" dur="indefinite" restart="never" nodeType="tmRoot"/>
+      </p:par>
+    </p:tnLst>
+  </p:timing>
+</p:sld>
+</file>
+
+<file path=ppt/slides/slide55.xml><?xml version="1.0" encoding="utf-8"?>
+<p:sld xmlns:a="http://schemas.openxmlformats.org/drawingml/2006/main" xmlns:r="http://schemas.openxmlformats.org/officeDocument/2006/relationships" xmlns:p="http://schemas.openxmlformats.org/presentationml/2006/main">
+  <p:cSld>
+    <p:spTree>
+      <p:nvGrpSpPr>
+        <p:cNvPr id="1" name=""/>
+        <p:cNvGrpSpPr/>
+        <p:nvPr/>
+      </p:nvGrpSpPr>
+      <p:grpSpPr>
+        <a:xfrm>
+          <a:off x="0" y="0"/>
+          <a:ext cx="0" cy="0"/>
+          <a:chOff x="0" y="0"/>
+          <a:chExt cx="0" cy="0"/>
+        </a:xfrm>
+      </p:grpSpPr>
+      <p:sp>
+        <p:nvSpPr>
+          <p:cNvPr id="6" name="Title 5"/>
+          <p:cNvSpPr>
+            <a:spLocks noGrp="1"/>
+          </p:cNvSpPr>
+          <p:nvPr>
+            <p:ph type="ctrTitle"/>
+          </p:nvPr>
+        </p:nvSpPr>
+        <p:spPr/>
+        <p:txBody>
+          <a:bodyPr/>
+          <a:lstStyle/>
+          <a:p>
+            <a:r>
+              <a:rPr lang="en-US" dirty="0" smtClean="0"/>
+              <a:t>Transformations</a:t>
+            </a:r>
+            <a:endParaRPr lang="en-US" dirty="0"/>
+          </a:p>
+        </p:txBody>
+      </p:sp>
+      <p:sp>
+        <p:nvSpPr>
+          <p:cNvPr id="7" name="Subtitle 6"/>
+          <p:cNvSpPr>
+            <a:spLocks noGrp="1"/>
+          </p:cNvSpPr>
+          <p:nvPr>
+            <p:ph type="subTitle" idx="1"/>
+          </p:nvPr>
+        </p:nvSpPr>
+        <p:spPr/>
+        <p:txBody>
+          <a:bodyPr/>
+          <a:lstStyle/>
+          <a:p>
+            <a:r>
+              <a:rPr lang="en-US" dirty="0" smtClean="0"/>
+              <a:t>Live Demo</a:t>
+            </a:r>
+            <a:endParaRPr lang="en-US" dirty="0"/>
+          </a:p>
+        </p:txBody>
+      </p:sp>
+    </p:spTree>
+    <p:extLst>
+      <p:ext uri="{BB962C8B-B14F-4D97-AF65-F5344CB8AC3E}">
+        <p14:creationId xmlns:p14="http://schemas.microsoft.com/office/powerpoint/2010/main" val="707370501"/>
+      </p:ext>
+    </p:extLst>
+  </p:cSld>
+  <p:clrMapOvr>
+    <a:masterClrMapping/>
+  </p:clrMapOvr>
+</p:sld>
+</file>
+
+<file path=ppt/slides/slide56.xml><?xml version="1.0" encoding="utf-8"?>
+<p:sld xmlns:a="http://schemas.openxmlformats.org/drawingml/2006/main" xmlns:r="http://schemas.openxmlformats.org/officeDocument/2006/relationships" xmlns:p="http://schemas.openxmlformats.org/presentationml/2006/main">
+  <p:cSld>
+    <p:spTree>
+      <p:nvGrpSpPr>
+        <p:cNvPr id="1" name=""/>
+        <p:cNvGrpSpPr/>
+        <p:nvPr/>
+      </p:nvGrpSpPr>
+      <p:grpSpPr>
+        <a:xfrm>
+          <a:off x="0" y="0"/>
+          <a:ext cx="0" cy="0"/>
+          <a:chOff x="0" y="0"/>
+          <a:chExt cx="0" cy="0"/>
+        </a:xfrm>
+      </p:grpSpPr>
+      <p:sp>
+        <p:nvSpPr>
+          <p:cNvPr id="2" name="Title 1"/>
+          <p:cNvSpPr>
+            <a:spLocks noGrp="1"/>
+          </p:cNvSpPr>
+          <p:nvPr>
+            <p:ph type="ctrTitle"/>
+          </p:nvPr>
+        </p:nvSpPr>
+        <p:spPr>
+          <a:xfrm>
+            <a:off x="609600" y="2133600"/>
+            <a:ext cx="7924800" cy="1295401"/>
+          </a:xfrm>
+        </p:spPr>
+        <p:txBody>
+          <a:bodyPr/>
+          <a:lstStyle/>
+          <a:p>
+            <a:r>
+              <a:rPr lang="en-US" dirty="0" smtClean="0"/>
+              <a:t>Canvas Per-pixel Manipulation</a:t>
+            </a:r>
+            <a:endParaRPr lang="en-US" dirty="0"/>
+          </a:p>
+        </p:txBody>
+      </p:sp>
+      <p:sp>
+        <p:nvSpPr>
+          <p:cNvPr id="3" name="Subtitle 2"/>
+          <p:cNvSpPr>
+            <a:spLocks noGrp="1"/>
+          </p:cNvSpPr>
+          <p:nvPr>
+            <p:ph type="subTitle" idx="1"/>
+          </p:nvPr>
+        </p:nvSpPr>
+        <p:spPr/>
+        <p:txBody>
+          <a:bodyPr/>
+          <a:lstStyle/>
+          <a:p>
+            <a:endParaRPr lang="en-US"/>
+          </a:p>
+        </p:txBody>
+      </p:sp>
+    </p:spTree>
+    <p:extLst>
+      <p:ext uri="{BB962C8B-B14F-4D97-AF65-F5344CB8AC3E}">
+        <p14:creationId xmlns:p14="http://schemas.microsoft.com/office/powerpoint/2010/main" val="1414682654"/>
+      </p:ext>
+    </p:extLst>
+  </p:cSld>
+  <p:clrMapOvr>
+    <a:masterClrMapping/>
+  </p:clrMapOvr>
+  <p:timing>
+    <p:tnLst>
+      <p:par>
+        <p:cTn id="1" dur="indefinite" restart="never" nodeType="tmRoot"/>
+      </p:par>
+    </p:tnLst>
+  </p:timing>
+</p:sld>
+</file>
+
+<file path=ppt/slides/slide57.xml><?xml version="1.0" encoding="utf-8"?>
+<p:sld xmlns:a="http://schemas.openxmlformats.org/drawingml/2006/main" xmlns:r="http://schemas.openxmlformats.org/officeDocument/2006/relationships" xmlns:p="http://schemas.openxmlformats.org/presentationml/2006/main">
+  <p:cSld>
+    <p:spTree>
+      <p:nvGrpSpPr>
+        <p:cNvPr id="1" name=""/>
+        <p:cNvGrpSpPr/>
+        <p:nvPr/>
+      </p:nvGrpSpPr>
+      <p:grpSpPr>
+        <a:xfrm>
+          <a:off x="0" y="0"/>
+          <a:ext cx="0" cy="0"/>
+          <a:chOff x="0" y="0"/>
+          <a:chExt cx="0" cy="0"/>
+        </a:xfrm>
+      </p:grpSpPr>
+      <p:sp>
+        <p:nvSpPr>
+          <p:cNvPr id="4" name="Title 3"/>
+          <p:cNvSpPr>
+            <a:spLocks noGrp="1"/>
+          </p:cNvSpPr>
+          <p:nvPr>
             <p:ph type="title"/>
           </p:nvPr>
         </p:nvSpPr>
@@ -24021,7 +25665,7 @@
 </p:sld>
 </file>
 
-<file path=ppt/slides/slide53.xml><?xml version="1.0" encoding="utf-8"?>
+<file path=ppt/slides/slide58.xml><?xml version="1.0" encoding="utf-8"?>
 <p:sld xmlns:a="http://schemas.openxmlformats.org/drawingml/2006/main" xmlns:r="http://schemas.openxmlformats.org/officeDocument/2006/relationships" xmlns:p="http://schemas.openxmlformats.org/presentationml/2006/main">
   <p:cSld>
     <p:spTree>
@@ -24494,7 +26138,7 @@
 </p:sld>
 </file>
 
-<file path=ppt/slides/slide54.xml><?xml version="1.0" encoding="utf-8"?>
+<file path=ppt/slides/slide59.xml><?xml version="1.0" encoding="utf-8"?>
 <p:sld xmlns:a="http://schemas.openxmlformats.org/drawingml/2006/main" xmlns:r="http://schemas.openxmlformats.org/officeDocument/2006/relationships" xmlns:p="http://schemas.openxmlformats.org/presentationml/2006/main">
   <p:cSld>
     <p:spTree>
@@ -24931,760 +26575,6 @@
     <p:extLst>
       <p:ext uri="{BB962C8B-B14F-4D97-AF65-F5344CB8AC3E}">
         <p14:creationId xmlns:p14="http://schemas.microsoft.com/office/powerpoint/2010/main" val="2596953655"/>
-      </p:ext>
-    </p:extLst>
-  </p:cSld>
-  <p:clrMapOvr>
-    <a:masterClrMapping/>
-  </p:clrMapOvr>
-  <p:timing>
-    <p:tnLst>
-      <p:par>
-        <p:cTn id="1" dur="indefinite" restart="never" nodeType="tmRoot"/>
-      </p:par>
-    </p:tnLst>
-  </p:timing>
-</p:sld>
-</file>
-
-<file path=ppt/slides/slide55.xml><?xml version="1.0" encoding="utf-8"?>
-<p:sld xmlns:a="http://schemas.openxmlformats.org/drawingml/2006/main" xmlns:r="http://schemas.openxmlformats.org/officeDocument/2006/relationships" xmlns:p="http://schemas.openxmlformats.org/presentationml/2006/main">
-  <p:cSld>
-    <p:spTree>
-      <p:nvGrpSpPr>
-        <p:cNvPr id="1" name=""/>
-        <p:cNvGrpSpPr/>
-        <p:nvPr/>
-      </p:nvGrpSpPr>
-      <p:grpSpPr>
-        <a:xfrm>
-          <a:off x="0" y="0"/>
-          <a:ext cx="0" cy="0"/>
-          <a:chOff x="0" y="0"/>
-          <a:chExt cx="0" cy="0"/>
-        </a:xfrm>
-      </p:grpSpPr>
-      <p:sp>
-        <p:nvSpPr>
-          <p:cNvPr id="2" name="Title 1"/>
-          <p:cNvSpPr>
-            <a:spLocks noGrp="1"/>
-          </p:cNvSpPr>
-          <p:nvPr>
-            <p:ph type="ctrTitle"/>
-          </p:nvPr>
-        </p:nvSpPr>
-        <p:spPr>
-          <a:xfrm>
-            <a:off x="609600" y="2133600"/>
-            <a:ext cx="7924800" cy="1295401"/>
-          </a:xfrm>
-        </p:spPr>
-        <p:txBody>
-          <a:bodyPr/>
-          <a:lstStyle/>
-          <a:p>
-            <a:r>
-              <a:rPr lang="en-US" dirty="0" smtClean="0"/>
-              <a:t>Canvas Per-pixel Manipulation</a:t>
-            </a:r>
-            <a:endParaRPr lang="en-US" dirty="0"/>
-          </a:p>
-        </p:txBody>
-      </p:sp>
-      <p:sp>
-        <p:nvSpPr>
-          <p:cNvPr id="3" name="Subtitle 2"/>
-          <p:cNvSpPr>
-            <a:spLocks noGrp="1"/>
-          </p:cNvSpPr>
-          <p:nvPr>
-            <p:ph type="subTitle" idx="1"/>
-          </p:nvPr>
-        </p:nvSpPr>
-        <p:spPr/>
-        <p:txBody>
-          <a:bodyPr/>
-          <a:lstStyle/>
-          <a:p>
-            <a:r>
-              <a:rPr lang="en-US" dirty="0" smtClean="0"/>
-              <a:t>Live Demo</a:t>
-            </a:r>
-            <a:endParaRPr lang="en-US" dirty="0"/>
-          </a:p>
-        </p:txBody>
-      </p:sp>
-    </p:spTree>
-    <p:extLst>
-      <p:ext uri="{BB962C8B-B14F-4D97-AF65-F5344CB8AC3E}">
-        <p14:creationId xmlns:p14="http://schemas.microsoft.com/office/powerpoint/2010/main" val="2020178015"/>
-      </p:ext>
-    </p:extLst>
-  </p:cSld>
-  <p:clrMapOvr>
-    <a:masterClrMapping/>
-  </p:clrMapOvr>
-  <p:timing>
-    <p:tnLst>
-      <p:par>
-        <p:cTn id="1" dur="indefinite" restart="never" nodeType="tmRoot"/>
-      </p:par>
-    </p:tnLst>
-  </p:timing>
-</p:sld>
-</file>
-
-<file path=ppt/slides/slide56.xml><?xml version="1.0" encoding="utf-8"?>
-<p:sld xmlns:a="http://schemas.openxmlformats.org/drawingml/2006/main" xmlns:r="http://schemas.openxmlformats.org/officeDocument/2006/relationships" xmlns:p="http://schemas.openxmlformats.org/presentationml/2006/main">
-  <p:cSld>
-    <p:spTree>
-      <p:nvGrpSpPr>
-        <p:cNvPr id="1" name=""/>
-        <p:cNvGrpSpPr/>
-        <p:nvPr/>
-      </p:nvGrpSpPr>
-      <p:grpSpPr>
-        <a:xfrm>
-          <a:off x="0" y="0"/>
-          <a:ext cx="0" cy="0"/>
-          <a:chOff x="0" y="0"/>
-          <a:chExt cx="0" cy="0"/>
-        </a:xfrm>
-      </p:grpSpPr>
-      <p:sp>
-        <p:nvSpPr>
-          <p:cNvPr id="4" name="Title 3"/>
-          <p:cNvSpPr>
-            <a:spLocks noGrp="1"/>
-          </p:cNvSpPr>
-          <p:nvPr>
-            <p:ph type="title"/>
-          </p:nvPr>
-        </p:nvSpPr>
-        <p:spPr/>
-        <p:txBody>
-          <a:bodyPr/>
-          <a:lstStyle/>
-          <a:p>
-            <a:r>
-              <a:rPr lang="en-US" dirty="0" smtClean="0"/>
-              <a:t>The Canvas</a:t>
-            </a:r>
-            <a:endParaRPr lang="en-US" dirty="0"/>
-          </a:p>
-        </p:txBody>
-      </p:sp>
-      <p:sp>
-        <p:nvSpPr>
-          <p:cNvPr id="5" name="Text Placeholder 4"/>
-          <p:cNvSpPr>
-            <a:spLocks noGrp="1"/>
-          </p:cNvSpPr>
-          <p:nvPr>
-            <p:ph type="body" sz="quarter" idx="10"/>
-          </p:nvPr>
-        </p:nvSpPr>
-        <p:spPr>
-          <a:xfrm>
-            <a:off x="6067891" y="6400800"/>
-            <a:ext cx="2957797" cy="369332"/>
-          </a:xfrm>
-        </p:spPr>
-        <p:txBody>
-          <a:bodyPr/>
-          <a:lstStyle/>
-          <a:p>
-            <a:r>
-              <a:rPr lang="en-US" dirty="0" smtClean="0">
-                <a:hlinkClick r:id="rId2"/>
-              </a:rPr>
-              <a:t>http://academy.telerik.com</a:t>
-            </a:r>
-            <a:endParaRPr lang="en-US" dirty="0"/>
-          </a:p>
-        </p:txBody>
-      </p:sp>
-    </p:spTree>
-    <p:extLst>
-      <p:ext uri="{BB962C8B-B14F-4D97-AF65-F5344CB8AC3E}">
-        <p14:creationId xmlns:p14="http://schemas.microsoft.com/office/powerpoint/2010/main" val="3810595330"/>
-      </p:ext>
-    </p:extLst>
-  </p:cSld>
-  <p:clrMapOvr>
-    <a:masterClrMapping/>
-  </p:clrMapOvr>
-  <p:timing>
-    <p:tnLst>
-      <p:par>
-        <p:cTn id="1" dur="indefinite" restart="never" nodeType="tmRoot"/>
-      </p:par>
-    </p:tnLst>
-  </p:timing>
-</p:sld>
-</file>
-
-<file path=ppt/slides/slide57.xml><?xml version="1.0" encoding="utf-8"?>
-<p:sld xmlns:a="http://schemas.openxmlformats.org/drawingml/2006/main" xmlns:r="http://schemas.openxmlformats.org/officeDocument/2006/relationships" xmlns:p="http://schemas.openxmlformats.org/presentationml/2006/main">
-  <p:cSld>
-    <p:spTree>
-      <p:nvGrpSpPr>
-        <p:cNvPr id="1" name=""/>
-        <p:cNvGrpSpPr/>
-        <p:nvPr/>
-      </p:nvGrpSpPr>
-      <p:grpSpPr>
-        <a:xfrm>
-          <a:off x="0" y="0"/>
-          <a:ext cx="0" cy="0"/>
-          <a:chOff x="0" y="0"/>
-          <a:chExt cx="0" cy="0"/>
-        </a:xfrm>
-      </p:grpSpPr>
-      <p:sp>
-        <p:nvSpPr>
-          <p:cNvPr id="2" name="Title 1"/>
-          <p:cNvSpPr>
-            <a:spLocks noGrp="1"/>
-          </p:cNvSpPr>
-          <p:nvPr>
-            <p:ph type="title"/>
-          </p:nvPr>
-        </p:nvSpPr>
-        <p:spPr/>
-        <p:txBody>
-          <a:bodyPr/>
-          <a:lstStyle/>
-          <a:p>
-            <a:r>
-              <a:rPr lang="en-US" dirty="0" smtClean="0"/>
-              <a:t>Homework</a:t>
-            </a:r>
-            <a:endParaRPr lang="en-US" dirty="0"/>
-          </a:p>
-        </p:txBody>
-      </p:sp>
-      <p:sp>
-        <p:nvSpPr>
-          <p:cNvPr id="4" name="Content Placeholder 3"/>
-          <p:cNvSpPr>
-            <a:spLocks noGrp="1"/>
-          </p:cNvSpPr>
-          <p:nvPr>
-            <p:ph idx="1"/>
-          </p:nvPr>
-        </p:nvSpPr>
-        <p:spPr>
-          <a:xfrm>
-            <a:off x="228600" y="1091455"/>
-            <a:ext cx="8686800" cy="762000"/>
-          </a:xfrm>
-        </p:spPr>
-        <p:txBody>
-          <a:bodyPr/>
-          <a:lstStyle/>
-          <a:p>
-            <a:pPr marL="400050" indent="-400050">
-              <a:buFont typeface="+mj-lt"/>
-              <a:buAutoNum type="arabicPeriod"/>
-            </a:pPr>
-            <a:r>
-              <a:rPr lang="en-US" dirty="0" smtClean="0"/>
-              <a:t>Draw</a:t>
-            </a:r>
-            <a:r>
-              <a:rPr lang="en-US" sz="2800" dirty="0" smtClean="0"/>
-              <a:t> </a:t>
-            </a:r>
-            <a:r>
-              <a:rPr lang="en-US" dirty="0" smtClean="0"/>
-              <a:t>the following graphics using canvas:</a:t>
-            </a:r>
-            <a:endParaRPr lang="en-US" dirty="0"/>
-          </a:p>
-        </p:txBody>
-      </p:sp>
-      <p:pic>
-        <p:nvPicPr>
-          <p:cNvPr id="1026" name="Picture 2"/>
-          <p:cNvPicPr>
-            <a:picLocks noChangeAspect="1" noChangeArrowheads="1"/>
-          </p:cNvPicPr>
-          <p:nvPr/>
-        </p:nvPicPr>
-        <p:blipFill>
-          <a:blip r:embed="rId2">
-            <a:extLst>
-              <a:ext uri="{28A0092B-C50C-407E-A947-70E740481C1C}">
-                <a14:useLocalDpi xmlns:a14="http://schemas.microsoft.com/office/drawing/2010/main"/>
-              </a:ext>
-            </a:extLst>
-          </a:blip>
-          <a:srcRect/>
-          <a:stretch>
-            <a:fillRect/>
-          </a:stretch>
-        </p:blipFill>
-        <p:spPr bwMode="auto">
-          <a:xfrm>
-            <a:off x="1752600" y="2172771"/>
-            <a:ext cx="1536700" cy="2163763"/>
-          </a:xfrm>
-          <a:prstGeom prst="rect">
-            <a:avLst/>
-          </a:prstGeom>
-          <a:noFill/>
-          <a:ln>
-            <a:noFill/>
-          </a:ln>
-          <a:effectLst/>
-          <a:extLst>
-            <a:ext uri="{909E8E84-426E-40DD-AFC4-6F175D3DCCD1}">
-              <a14:hiddenFill xmlns:a14="http://schemas.microsoft.com/office/drawing/2010/main">
-                <a:solidFill>
-                  <a:schemeClr val="accent1"/>
-                </a:solidFill>
-              </a14:hiddenFill>
-            </a:ext>
-            <a:ext uri="{91240B29-F687-4F45-9708-019B960494DF}">
-              <a14:hiddenLine xmlns:a14="http://schemas.microsoft.com/office/drawing/2010/main" w="9525">
-                <a:solidFill>
-                  <a:schemeClr val="tx1"/>
-                </a:solidFill>
-                <a:miter lim="800000"/>
-                <a:headEnd/>
-                <a:tailEnd/>
-              </a14:hiddenLine>
-            </a:ext>
-            <a:ext uri="{AF507438-7753-43E0-B8FC-AC1667EBCBE1}">
-              <a14:hiddenEffects xmlns:a14="http://schemas.microsoft.com/office/drawing/2010/main">
-                <a:effectLst>
-                  <a:outerShdw dist="35921" dir="2700000" algn="ctr" rotWithShape="0">
-                    <a:schemeClr val="bg2"/>
-                  </a:outerShdw>
-                </a:effectLst>
-              </a14:hiddenEffects>
-            </a:ext>
-          </a:extLst>
-        </p:spPr>
-      </p:pic>
-      <p:pic>
-        <p:nvPicPr>
-          <p:cNvPr id="1027" name="Picture 3"/>
-          <p:cNvPicPr>
-            <a:picLocks noChangeAspect="1" noChangeArrowheads="1"/>
-          </p:cNvPicPr>
-          <p:nvPr/>
-        </p:nvPicPr>
-        <p:blipFill>
-          <a:blip r:embed="rId3">
-            <a:extLst>
-              <a:ext uri="{28A0092B-C50C-407E-A947-70E740481C1C}">
-                <a14:useLocalDpi xmlns:a14="http://schemas.microsoft.com/office/drawing/2010/main"/>
-              </a:ext>
-            </a:extLst>
-          </a:blip>
-          <a:srcRect/>
-          <a:stretch>
-            <a:fillRect/>
-          </a:stretch>
-        </p:blipFill>
-        <p:spPr bwMode="auto">
-          <a:xfrm>
-            <a:off x="1371600" y="4336534"/>
-            <a:ext cx="3303587" cy="2079625"/>
-          </a:xfrm>
-          <a:prstGeom prst="rect">
-            <a:avLst/>
-          </a:prstGeom>
-          <a:noFill/>
-          <a:ln>
-            <a:noFill/>
-          </a:ln>
-          <a:effectLst/>
-          <a:extLst>
-            <a:ext uri="{909E8E84-426E-40DD-AFC4-6F175D3DCCD1}">
-              <a14:hiddenFill xmlns:a14="http://schemas.microsoft.com/office/drawing/2010/main">
-                <a:solidFill>
-                  <a:schemeClr val="accent1"/>
-                </a:solidFill>
-              </a14:hiddenFill>
-            </a:ext>
-            <a:ext uri="{91240B29-F687-4F45-9708-019B960494DF}">
-              <a14:hiddenLine xmlns:a14="http://schemas.microsoft.com/office/drawing/2010/main" w="9525">
-                <a:solidFill>
-                  <a:schemeClr val="tx1"/>
-                </a:solidFill>
-                <a:miter lim="800000"/>
-                <a:headEnd/>
-                <a:tailEnd/>
-              </a14:hiddenLine>
-            </a:ext>
-            <a:ext uri="{AF507438-7753-43E0-B8FC-AC1667EBCBE1}">
-              <a14:hiddenEffects xmlns:a14="http://schemas.microsoft.com/office/drawing/2010/main">
-                <a:effectLst>
-                  <a:outerShdw dist="35921" dir="2700000" algn="ctr" rotWithShape="0">
-                    <a:schemeClr val="bg2"/>
-                  </a:outerShdw>
-                </a:effectLst>
-              </a14:hiddenEffects>
-            </a:ext>
-          </a:extLst>
-        </p:spPr>
-      </p:pic>
-      <p:pic>
-        <p:nvPicPr>
-          <p:cNvPr id="3" name="Picture 2"/>
-          <p:cNvPicPr>
-            <a:picLocks noChangeAspect="1"/>
-          </p:cNvPicPr>
-          <p:nvPr/>
-        </p:nvPicPr>
-        <p:blipFill>
-          <a:blip r:embed="rId4"/>
-          <a:stretch>
-            <a:fillRect/>
-          </a:stretch>
-        </p:blipFill>
-        <p:spPr>
-          <a:xfrm>
-            <a:off x="5867400" y="1849597"/>
-            <a:ext cx="2767824" cy="3603048"/>
-          </a:xfrm>
-          <a:prstGeom prst="rect">
-            <a:avLst/>
-          </a:prstGeom>
-        </p:spPr>
-      </p:pic>
-    </p:spTree>
-    <p:extLst>
-      <p:ext uri="{BB962C8B-B14F-4D97-AF65-F5344CB8AC3E}">
-        <p14:creationId xmlns:p14="http://schemas.microsoft.com/office/powerpoint/2010/main" val="1990388660"/>
-      </p:ext>
-    </p:extLst>
-  </p:cSld>
-  <p:clrMapOvr>
-    <a:masterClrMapping/>
-  </p:clrMapOvr>
-  <mc:AlternateContent xmlns:mc="http://schemas.openxmlformats.org/markup-compatibility/2006" xmlns:p14="http://schemas.microsoft.com/office/powerpoint/2010/main">
-    <mc:Choice Requires="p14">
-      <p:transition p14:dur="0"/>
-    </mc:Choice>
-    <mc:Fallback xmlns="">
-      <p:transition/>
-    </mc:Fallback>
-  </mc:AlternateContent>
-  <p:timing>
-    <p:tnLst>
-      <p:par>
-        <p:cTn id="1" dur="indefinite" restart="never" nodeType="tmRoot"/>
-      </p:par>
-    </p:tnLst>
-  </p:timing>
-</p:sld>
-</file>
-
-<file path=ppt/slides/slide58.xml><?xml version="1.0" encoding="utf-8"?>
-<p:sld xmlns:a="http://schemas.openxmlformats.org/drawingml/2006/main" xmlns:r="http://schemas.openxmlformats.org/officeDocument/2006/relationships" xmlns:p="http://schemas.openxmlformats.org/presentationml/2006/main">
-  <p:cSld>
-    <p:spTree>
-      <p:nvGrpSpPr>
-        <p:cNvPr id="1" name=""/>
-        <p:cNvGrpSpPr/>
-        <p:nvPr/>
-      </p:nvGrpSpPr>
-      <p:grpSpPr>
-        <a:xfrm>
-          <a:off x="0" y="0"/>
-          <a:ext cx="0" cy="0"/>
-          <a:chOff x="0" y="0"/>
-          <a:chExt cx="0" cy="0"/>
-        </a:xfrm>
-      </p:grpSpPr>
-      <p:sp>
-        <p:nvSpPr>
-          <p:cNvPr id="2" name="Title 1"/>
-          <p:cNvSpPr>
-            <a:spLocks noGrp="1"/>
-          </p:cNvSpPr>
-          <p:nvPr>
-            <p:ph type="title"/>
-          </p:nvPr>
-        </p:nvSpPr>
-        <p:spPr/>
-        <p:txBody>
-          <a:bodyPr/>
-          <a:lstStyle/>
-          <a:p>
-            <a:r>
-              <a:rPr lang="en-US" dirty="0" smtClean="0"/>
-              <a:t>Homework (5)</a:t>
-            </a:r>
-            <a:endParaRPr lang="bg-BG" dirty="0"/>
-          </a:p>
-        </p:txBody>
-      </p:sp>
-      <p:sp>
-        <p:nvSpPr>
-          <p:cNvPr id="3" name="Content Placeholder 2"/>
-          <p:cNvSpPr>
-            <a:spLocks noGrp="1"/>
-          </p:cNvSpPr>
-          <p:nvPr>
-            <p:ph idx="1"/>
-          </p:nvPr>
-        </p:nvSpPr>
-        <p:spPr>
-          <a:xfrm>
-            <a:off x="228600" y="1143000"/>
-            <a:ext cx="8686800" cy="1295400"/>
-          </a:xfrm>
-        </p:spPr>
-        <p:txBody>
-          <a:bodyPr/>
-          <a:lstStyle/>
-          <a:p>
-            <a:pPr marL="514350" indent="-514350">
-              <a:buFont typeface="+mj-lt"/>
-              <a:buAutoNum type="arabicPeriod" startAt="2"/>
-            </a:pPr>
-            <a:r>
-              <a:rPr lang="en-US" sz="2800" dirty="0"/>
-              <a:t>Draw a </a:t>
-            </a:r>
-            <a:r>
-              <a:rPr lang="en-US" sz="2800" dirty="0" smtClean="0"/>
-              <a:t>circle that flies inside a box</a:t>
-            </a:r>
-          </a:p>
-          <a:p>
-            <a:pPr marL="712788" lvl="1" indent="-357188"/>
-            <a:r>
-              <a:rPr lang="en-US" sz="2600" dirty="0" smtClean="0"/>
-              <a:t>When it reaches an edge, it should bounce that edge</a:t>
-            </a:r>
-          </a:p>
-          <a:p>
-            <a:pPr marL="712788" lvl="1" indent="-357188"/>
-            <a:endParaRPr lang="bg-BG" dirty="0"/>
-          </a:p>
-        </p:txBody>
-      </p:sp>
-      <p:pic>
-        <p:nvPicPr>
-          <p:cNvPr id="45" name="Picture 44"/>
-          <p:cNvPicPr>
-            <a:picLocks noChangeAspect="1"/>
-          </p:cNvPicPr>
-          <p:nvPr/>
-        </p:nvPicPr>
-        <p:blipFill>
-          <a:blip r:embed="rId2"/>
-          <a:stretch>
-            <a:fillRect/>
-          </a:stretch>
-        </p:blipFill>
-        <p:spPr>
-          <a:xfrm>
-            <a:off x="1481060" y="2438400"/>
-            <a:ext cx="6181880" cy="3816427"/>
-          </a:xfrm>
-          <a:prstGeom prst="rect">
-            <a:avLst/>
-          </a:prstGeom>
-        </p:spPr>
-      </p:pic>
-    </p:spTree>
-    <p:extLst>
-      <p:ext uri="{BB962C8B-B14F-4D97-AF65-F5344CB8AC3E}">
-        <p14:creationId xmlns:p14="http://schemas.microsoft.com/office/powerpoint/2010/main" val="802043695"/>
-      </p:ext>
-    </p:extLst>
-  </p:cSld>
-  <p:clrMapOvr>
-    <a:masterClrMapping/>
-  </p:clrMapOvr>
-  <p:timing>
-    <p:tnLst>
-      <p:par>
-        <p:cTn id="1" dur="indefinite" restart="never" nodeType="tmRoot"/>
-      </p:par>
-    </p:tnLst>
-  </p:timing>
-</p:sld>
-</file>
-
-<file path=ppt/slides/slide59.xml><?xml version="1.0" encoding="utf-8"?>
-<p:sld xmlns:a="http://schemas.openxmlformats.org/drawingml/2006/main" xmlns:r="http://schemas.openxmlformats.org/officeDocument/2006/relationships" xmlns:p="http://schemas.openxmlformats.org/presentationml/2006/main">
-  <p:cSld>
-    <p:spTree>
-      <p:nvGrpSpPr>
-        <p:cNvPr id="1" name=""/>
-        <p:cNvGrpSpPr/>
-        <p:nvPr/>
-      </p:nvGrpSpPr>
-      <p:grpSpPr>
-        <a:xfrm>
-          <a:off x="0" y="0"/>
-          <a:ext cx="0" cy="0"/>
-          <a:chOff x="0" y="0"/>
-          <a:chExt cx="0" cy="0"/>
-        </a:xfrm>
-      </p:grpSpPr>
-      <p:sp>
-        <p:nvSpPr>
-          <p:cNvPr id="2" name="Title 1"/>
-          <p:cNvSpPr>
-            <a:spLocks noGrp="1"/>
-          </p:cNvSpPr>
-          <p:nvPr>
-            <p:ph type="title"/>
-          </p:nvPr>
-        </p:nvSpPr>
-        <p:spPr/>
-        <p:txBody>
-          <a:bodyPr/>
-          <a:lstStyle/>
-          <a:p>
-            <a:r>
-              <a:rPr lang="en-US" dirty="0" smtClean="0"/>
-              <a:t>Homework (7)</a:t>
-            </a:r>
-            <a:endParaRPr lang="bg-BG" dirty="0"/>
-          </a:p>
-        </p:txBody>
-      </p:sp>
-      <p:sp>
-        <p:nvSpPr>
-          <p:cNvPr id="3" name="Content Placeholder 2"/>
-          <p:cNvSpPr>
-            <a:spLocks noGrp="1"/>
-          </p:cNvSpPr>
-          <p:nvPr>
-            <p:ph idx="1"/>
-          </p:nvPr>
-        </p:nvSpPr>
-        <p:spPr/>
-        <p:txBody>
-          <a:bodyPr/>
-          <a:lstStyle/>
-          <a:p>
-            <a:pPr marL="514350" indent="-514350">
-              <a:lnSpc>
-                <a:spcPct val="100000"/>
-              </a:lnSpc>
-              <a:spcBef>
-                <a:spcPts val="300"/>
-              </a:spcBef>
-              <a:buFont typeface="+mj-lt"/>
-              <a:buAutoNum type="arabicPeriod" startAt="3"/>
-            </a:pPr>
-            <a:r>
-              <a:rPr lang="en-US" sz="2800" dirty="0" smtClean="0"/>
-              <a:t>*Create the famous game "Snake"</a:t>
-            </a:r>
-          </a:p>
-          <a:p>
-            <a:pPr marL="712788" lvl="1" indent="-357188">
-              <a:lnSpc>
-                <a:spcPct val="100000"/>
-              </a:lnSpc>
-              <a:spcBef>
-                <a:spcPts val="300"/>
-              </a:spcBef>
-            </a:pPr>
-            <a:r>
-              <a:rPr lang="en-US" dirty="0" smtClean="0"/>
-              <a:t>The snake is a sequence of rectangles/ellipses</a:t>
-            </a:r>
-          </a:p>
-          <a:p>
-            <a:pPr marL="712788" lvl="1" indent="-357188">
-              <a:lnSpc>
-                <a:spcPct val="100000"/>
-              </a:lnSpc>
-              <a:spcBef>
-                <a:spcPts val="300"/>
-              </a:spcBef>
-            </a:pPr>
-            <a:r>
-              <a:rPr lang="en-US" dirty="0" smtClean="0"/>
-              <a:t>The snake can move left, right, up or down</a:t>
-            </a:r>
-          </a:p>
-          <a:p>
-            <a:pPr marL="712788" lvl="1" indent="-357188">
-              <a:lnSpc>
-                <a:spcPct val="100000"/>
-              </a:lnSpc>
-              <a:spcBef>
-                <a:spcPts val="300"/>
-              </a:spcBef>
-            </a:pPr>
-            <a:r>
-              <a:rPr lang="en-US" dirty="0" smtClean="0"/>
-              <a:t>The snake dies if it reaches any of the edges or when it tries to eat itself</a:t>
-            </a:r>
-          </a:p>
-          <a:p>
-            <a:pPr marL="712788" lvl="1" indent="-357188">
-              <a:lnSpc>
-                <a:spcPct val="100000"/>
-              </a:lnSpc>
-              <a:spcBef>
-                <a:spcPts val="300"/>
-              </a:spcBef>
-            </a:pPr>
-            <a:r>
-              <a:rPr lang="en-US" dirty="0" smtClean="0"/>
-              <a:t>A food should be generated</a:t>
-            </a:r>
-          </a:p>
-          <a:p>
-            <a:pPr marL="1004888" lvl="2" indent="-357188">
-              <a:lnSpc>
-                <a:spcPct val="100000"/>
-              </a:lnSpc>
-              <a:spcBef>
-                <a:spcPts val="300"/>
-              </a:spcBef>
-            </a:pPr>
-            <a:r>
-              <a:rPr lang="en-US" dirty="0" smtClean="0"/>
-              <a:t>When the snake eats the food, it grows and new food is generated at random position</a:t>
-            </a:r>
-            <a:endParaRPr lang="en-US" dirty="0"/>
-          </a:p>
-          <a:p>
-            <a:pPr marL="712788" lvl="1" indent="-357188">
-              <a:lnSpc>
-                <a:spcPct val="100000"/>
-              </a:lnSpc>
-              <a:spcBef>
-                <a:spcPts val="300"/>
-              </a:spcBef>
-            </a:pPr>
-            <a:r>
-              <a:rPr lang="en-US" smtClean="0"/>
-              <a:t>Implement </a:t>
-            </a:r>
-            <a:r>
-              <a:rPr lang="en-US" dirty="0" smtClean="0"/>
-              <a:t>a high-score board, kept in </a:t>
-            </a:r>
-            <a:r>
-              <a:rPr lang="en-US" dirty="0" err="1" smtClean="0"/>
-              <a:t>localStorage</a:t>
-            </a:r>
-            <a:endParaRPr lang="en-US" dirty="0" smtClean="0"/>
-          </a:p>
-        </p:txBody>
-      </p:sp>
-    </p:spTree>
-    <p:extLst>
-      <p:ext uri="{BB962C8B-B14F-4D97-AF65-F5344CB8AC3E}">
-        <p14:creationId xmlns:p14="http://schemas.microsoft.com/office/powerpoint/2010/main" val="3819199288"/>
       </p:ext>
     </p:extLst>
   </p:cSld>
@@ -26110,7 +27000,7 @@
             </a:r>
             <a:r>
               <a:rPr lang="en-US" dirty="0" smtClean="0"/>
-              <a:t>("the-canvas");</a:t>
+              <a:t>('the-canvas');</a:t>
             </a:r>
           </a:p>
           <a:p>
@@ -26136,7 +27026,7 @@
             </a:r>
             <a:r>
               <a:rPr lang="en-US" dirty="0" smtClean="0"/>
-              <a:t>("2d");</a:t>
+              <a:t>('2d');</a:t>
             </a:r>
           </a:p>
           <a:p>
@@ -26330,6 +27220,756 @@
 </p:sld>
 </file>
 
+<file path=ppt/slides/slide60.xml><?xml version="1.0" encoding="utf-8"?>
+<p:sld xmlns:a="http://schemas.openxmlformats.org/drawingml/2006/main" xmlns:r="http://schemas.openxmlformats.org/officeDocument/2006/relationships" xmlns:p="http://schemas.openxmlformats.org/presentationml/2006/main">
+  <p:cSld>
+    <p:spTree>
+      <p:nvGrpSpPr>
+        <p:cNvPr id="1" name=""/>
+        <p:cNvGrpSpPr/>
+        <p:nvPr/>
+      </p:nvGrpSpPr>
+      <p:grpSpPr>
+        <a:xfrm>
+          <a:off x="0" y="0"/>
+          <a:ext cx="0" cy="0"/>
+          <a:chOff x="0" y="0"/>
+          <a:chExt cx="0" cy="0"/>
+        </a:xfrm>
+      </p:grpSpPr>
+      <p:sp>
+        <p:nvSpPr>
+          <p:cNvPr id="2" name="Title 1"/>
+          <p:cNvSpPr>
+            <a:spLocks noGrp="1"/>
+          </p:cNvSpPr>
+          <p:nvPr>
+            <p:ph type="ctrTitle"/>
+          </p:nvPr>
+        </p:nvSpPr>
+        <p:spPr>
+          <a:xfrm>
+            <a:off x="609600" y="2133600"/>
+            <a:ext cx="7924800" cy="1295401"/>
+          </a:xfrm>
+        </p:spPr>
+        <p:txBody>
+          <a:bodyPr/>
+          <a:lstStyle/>
+          <a:p>
+            <a:r>
+              <a:rPr lang="en-US" dirty="0" smtClean="0"/>
+              <a:t>Canvas Per-pixel Manipulation</a:t>
+            </a:r>
+            <a:endParaRPr lang="en-US" dirty="0"/>
+          </a:p>
+        </p:txBody>
+      </p:sp>
+      <p:sp>
+        <p:nvSpPr>
+          <p:cNvPr id="3" name="Subtitle 2"/>
+          <p:cNvSpPr>
+            <a:spLocks noGrp="1"/>
+          </p:cNvSpPr>
+          <p:nvPr>
+            <p:ph type="subTitle" idx="1"/>
+          </p:nvPr>
+        </p:nvSpPr>
+        <p:spPr/>
+        <p:txBody>
+          <a:bodyPr/>
+          <a:lstStyle/>
+          <a:p>
+            <a:r>
+              <a:rPr lang="en-US" dirty="0" smtClean="0"/>
+              <a:t>Live Demo</a:t>
+            </a:r>
+            <a:endParaRPr lang="en-US" dirty="0"/>
+          </a:p>
+        </p:txBody>
+      </p:sp>
+    </p:spTree>
+    <p:extLst>
+      <p:ext uri="{BB962C8B-B14F-4D97-AF65-F5344CB8AC3E}">
+        <p14:creationId xmlns:p14="http://schemas.microsoft.com/office/powerpoint/2010/main" val="2020178015"/>
+      </p:ext>
+    </p:extLst>
+  </p:cSld>
+  <p:clrMapOvr>
+    <a:masterClrMapping/>
+  </p:clrMapOvr>
+  <p:timing>
+    <p:tnLst>
+      <p:par>
+        <p:cTn id="1" dur="indefinite" restart="never" nodeType="tmRoot"/>
+      </p:par>
+    </p:tnLst>
+  </p:timing>
+</p:sld>
+</file>
+
+<file path=ppt/slides/slide61.xml><?xml version="1.0" encoding="utf-8"?>
+<p:sld xmlns:a="http://schemas.openxmlformats.org/drawingml/2006/main" xmlns:r="http://schemas.openxmlformats.org/officeDocument/2006/relationships" xmlns:p="http://schemas.openxmlformats.org/presentationml/2006/main">
+  <p:cSld>
+    <p:spTree>
+      <p:nvGrpSpPr>
+        <p:cNvPr id="1" name=""/>
+        <p:cNvGrpSpPr/>
+        <p:nvPr/>
+      </p:nvGrpSpPr>
+      <p:grpSpPr>
+        <a:xfrm>
+          <a:off x="0" y="0"/>
+          <a:ext cx="0" cy="0"/>
+          <a:chOff x="0" y="0"/>
+          <a:chExt cx="0" cy="0"/>
+        </a:xfrm>
+      </p:grpSpPr>
+      <p:sp>
+        <p:nvSpPr>
+          <p:cNvPr id="4" name="Title 3"/>
+          <p:cNvSpPr>
+            <a:spLocks noGrp="1"/>
+          </p:cNvSpPr>
+          <p:nvPr>
+            <p:ph type="title"/>
+          </p:nvPr>
+        </p:nvSpPr>
+        <p:spPr/>
+        <p:txBody>
+          <a:bodyPr/>
+          <a:lstStyle/>
+          <a:p>
+            <a:r>
+              <a:rPr lang="en-US" dirty="0" smtClean="0"/>
+              <a:t>The Canvas</a:t>
+            </a:r>
+            <a:endParaRPr lang="en-US" dirty="0"/>
+          </a:p>
+        </p:txBody>
+      </p:sp>
+      <p:sp>
+        <p:nvSpPr>
+          <p:cNvPr id="5" name="Text Placeholder 4"/>
+          <p:cNvSpPr>
+            <a:spLocks noGrp="1"/>
+          </p:cNvSpPr>
+          <p:nvPr>
+            <p:ph type="body" sz="quarter" idx="10"/>
+          </p:nvPr>
+        </p:nvSpPr>
+        <p:spPr>
+          <a:xfrm>
+            <a:off x="6067891" y="6400800"/>
+            <a:ext cx="2957797" cy="369332"/>
+          </a:xfrm>
+        </p:spPr>
+        <p:txBody>
+          <a:bodyPr/>
+          <a:lstStyle/>
+          <a:p>
+            <a:r>
+              <a:rPr lang="en-US" dirty="0" smtClean="0">
+                <a:hlinkClick r:id="rId2"/>
+              </a:rPr>
+              <a:t>http://academy.telerik.com</a:t>
+            </a:r>
+            <a:endParaRPr lang="en-US" dirty="0"/>
+          </a:p>
+        </p:txBody>
+      </p:sp>
+    </p:spTree>
+    <p:extLst>
+      <p:ext uri="{BB962C8B-B14F-4D97-AF65-F5344CB8AC3E}">
+        <p14:creationId xmlns:p14="http://schemas.microsoft.com/office/powerpoint/2010/main" val="3810595330"/>
+      </p:ext>
+    </p:extLst>
+  </p:cSld>
+  <p:clrMapOvr>
+    <a:masterClrMapping/>
+  </p:clrMapOvr>
+  <p:timing>
+    <p:tnLst>
+      <p:par>
+        <p:cTn id="1" dur="indefinite" restart="never" nodeType="tmRoot"/>
+      </p:par>
+    </p:tnLst>
+  </p:timing>
+</p:sld>
+</file>
+
+<file path=ppt/slides/slide62.xml><?xml version="1.0" encoding="utf-8"?>
+<p:sld xmlns:a="http://schemas.openxmlformats.org/drawingml/2006/main" xmlns:r="http://schemas.openxmlformats.org/officeDocument/2006/relationships" xmlns:p="http://schemas.openxmlformats.org/presentationml/2006/main">
+  <p:cSld>
+    <p:spTree>
+      <p:nvGrpSpPr>
+        <p:cNvPr id="1" name=""/>
+        <p:cNvGrpSpPr/>
+        <p:nvPr/>
+      </p:nvGrpSpPr>
+      <p:grpSpPr>
+        <a:xfrm>
+          <a:off x="0" y="0"/>
+          <a:ext cx="0" cy="0"/>
+          <a:chOff x="0" y="0"/>
+          <a:chExt cx="0" cy="0"/>
+        </a:xfrm>
+      </p:grpSpPr>
+      <p:sp>
+        <p:nvSpPr>
+          <p:cNvPr id="2" name="Title 1"/>
+          <p:cNvSpPr>
+            <a:spLocks noGrp="1"/>
+          </p:cNvSpPr>
+          <p:nvPr>
+            <p:ph type="title"/>
+          </p:nvPr>
+        </p:nvSpPr>
+        <p:spPr/>
+        <p:txBody>
+          <a:bodyPr/>
+          <a:lstStyle/>
+          <a:p>
+            <a:r>
+              <a:rPr lang="en-US" dirty="0" smtClean="0"/>
+              <a:t>Homework</a:t>
+            </a:r>
+            <a:endParaRPr lang="en-US" dirty="0"/>
+          </a:p>
+        </p:txBody>
+      </p:sp>
+      <p:sp>
+        <p:nvSpPr>
+          <p:cNvPr id="4" name="Content Placeholder 3"/>
+          <p:cNvSpPr>
+            <a:spLocks noGrp="1"/>
+          </p:cNvSpPr>
+          <p:nvPr>
+            <p:ph idx="1"/>
+          </p:nvPr>
+        </p:nvSpPr>
+        <p:spPr>
+          <a:xfrm>
+            <a:off x="228600" y="1091455"/>
+            <a:ext cx="8686800" cy="762000"/>
+          </a:xfrm>
+        </p:spPr>
+        <p:txBody>
+          <a:bodyPr/>
+          <a:lstStyle/>
+          <a:p>
+            <a:pPr marL="400050" indent="-400050">
+              <a:buFont typeface="+mj-lt"/>
+              <a:buAutoNum type="arabicPeriod"/>
+            </a:pPr>
+            <a:r>
+              <a:rPr lang="en-US" dirty="0" smtClean="0"/>
+              <a:t>Draw</a:t>
+            </a:r>
+            <a:r>
+              <a:rPr lang="en-US" sz="2800" dirty="0" smtClean="0"/>
+              <a:t> </a:t>
+            </a:r>
+            <a:r>
+              <a:rPr lang="en-US" dirty="0" smtClean="0"/>
+              <a:t>the following graphics using canvas:</a:t>
+            </a:r>
+            <a:endParaRPr lang="en-US" dirty="0"/>
+          </a:p>
+        </p:txBody>
+      </p:sp>
+      <p:pic>
+        <p:nvPicPr>
+          <p:cNvPr id="1026" name="Picture 2"/>
+          <p:cNvPicPr>
+            <a:picLocks noChangeAspect="1" noChangeArrowheads="1"/>
+          </p:cNvPicPr>
+          <p:nvPr/>
+        </p:nvPicPr>
+        <p:blipFill>
+          <a:blip r:embed="rId2">
+            <a:extLst>
+              <a:ext uri="{28A0092B-C50C-407E-A947-70E740481C1C}">
+                <a14:useLocalDpi xmlns:a14="http://schemas.microsoft.com/office/drawing/2010/main"/>
+              </a:ext>
+            </a:extLst>
+          </a:blip>
+          <a:srcRect/>
+          <a:stretch>
+            <a:fillRect/>
+          </a:stretch>
+        </p:blipFill>
+        <p:spPr bwMode="auto">
+          <a:xfrm>
+            <a:off x="1752600" y="2172771"/>
+            <a:ext cx="1536700" cy="2163763"/>
+          </a:xfrm>
+          <a:prstGeom prst="rect">
+            <a:avLst/>
+          </a:prstGeom>
+          <a:noFill/>
+          <a:ln>
+            <a:noFill/>
+          </a:ln>
+          <a:effectLst/>
+          <a:extLst>
+            <a:ext uri="{909E8E84-426E-40DD-AFC4-6F175D3DCCD1}">
+              <a14:hiddenFill xmlns:a14="http://schemas.microsoft.com/office/drawing/2010/main">
+                <a:solidFill>
+                  <a:schemeClr val="accent1"/>
+                </a:solidFill>
+              </a14:hiddenFill>
+            </a:ext>
+            <a:ext uri="{91240B29-F687-4F45-9708-019B960494DF}">
+              <a14:hiddenLine xmlns:a14="http://schemas.microsoft.com/office/drawing/2010/main" w="9525">
+                <a:solidFill>
+                  <a:schemeClr val="tx1"/>
+                </a:solidFill>
+                <a:miter lim="800000"/>
+                <a:headEnd/>
+                <a:tailEnd/>
+              </a14:hiddenLine>
+            </a:ext>
+            <a:ext uri="{AF507438-7753-43E0-B8FC-AC1667EBCBE1}">
+              <a14:hiddenEffects xmlns:a14="http://schemas.microsoft.com/office/drawing/2010/main">
+                <a:effectLst>
+                  <a:outerShdw dist="35921" dir="2700000" algn="ctr" rotWithShape="0">
+                    <a:schemeClr val="bg2"/>
+                  </a:outerShdw>
+                </a:effectLst>
+              </a14:hiddenEffects>
+            </a:ext>
+          </a:extLst>
+        </p:spPr>
+      </p:pic>
+      <p:pic>
+        <p:nvPicPr>
+          <p:cNvPr id="1027" name="Picture 3"/>
+          <p:cNvPicPr>
+            <a:picLocks noChangeAspect="1" noChangeArrowheads="1"/>
+          </p:cNvPicPr>
+          <p:nvPr/>
+        </p:nvPicPr>
+        <p:blipFill>
+          <a:blip r:embed="rId3">
+            <a:extLst>
+              <a:ext uri="{28A0092B-C50C-407E-A947-70E740481C1C}">
+                <a14:useLocalDpi xmlns:a14="http://schemas.microsoft.com/office/drawing/2010/main"/>
+              </a:ext>
+            </a:extLst>
+          </a:blip>
+          <a:srcRect/>
+          <a:stretch>
+            <a:fillRect/>
+          </a:stretch>
+        </p:blipFill>
+        <p:spPr bwMode="auto">
+          <a:xfrm>
+            <a:off x="1371600" y="4336534"/>
+            <a:ext cx="3303587" cy="2079625"/>
+          </a:xfrm>
+          <a:prstGeom prst="rect">
+            <a:avLst/>
+          </a:prstGeom>
+          <a:noFill/>
+          <a:ln>
+            <a:noFill/>
+          </a:ln>
+          <a:effectLst/>
+          <a:extLst>
+            <a:ext uri="{909E8E84-426E-40DD-AFC4-6F175D3DCCD1}">
+              <a14:hiddenFill xmlns:a14="http://schemas.microsoft.com/office/drawing/2010/main">
+                <a:solidFill>
+                  <a:schemeClr val="accent1"/>
+                </a:solidFill>
+              </a14:hiddenFill>
+            </a:ext>
+            <a:ext uri="{91240B29-F687-4F45-9708-019B960494DF}">
+              <a14:hiddenLine xmlns:a14="http://schemas.microsoft.com/office/drawing/2010/main" w="9525">
+                <a:solidFill>
+                  <a:schemeClr val="tx1"/>
+                </a:solidFill>
+                <a:miter lim="800000"/>
+                <a:headEnd/>
+                <a:tailEnd/>
+              </a14:hiddenLine>
+            </a:ext>
+            <a:ext uri="{AF507438-7753-43E0-B8FC-AC1667EBCBE1}">
+              <a14:hiddenEffects xmlns:a14="http://schemas.microsoft.com/office/drawing/2010/main">
+                <a:effectLst>
+                  <a:outerShdw dist="35921" dir="2700000" algn="ctr" rotWithShape="0">
+                    <a:schemeClr val="bg2"/>
+                  </a:outerShdw>
+                </a:effectLst>
+              </a14:hiddenEffects>
+            </a:ext>
+          </a:extLst>
+        </p:spPr>
+      </p:pic>
+      <p:pic>
+        <p:nvPicPr>
+          <p:cNvPr id="3" name="Picture 2"/>
+          <p:cNvPicPr>
+            <a:picLocks noChangeAspect="1"/>
+          </p:cNvPicPr>
+          <p:nvPr/>
+        </p:nvPicPr>
+        <p:blipFill>
+          <a:blip r:embed="rId4"/>
+          <a:stretch>
+            <a:fillRect/>
+          </a:stretch>
+        </p:blipFill>
+        <p:spPr>
+          <a:xfrm>
+            <a:off x="5867400" y="1849597"/>
+            <a:ext cx="2767824" cy="3603048"/>
+          </a:xfrm>
+          <a:prstGeom prst="rect">
+            <a:avLst/>
+          </a:prstGeom>
+        </p:spPr>
+      </p:pic>
+    </p:spTree>
+    <p:extLst>
+      <p:ext uri="{BB962C8B-B14F-4D97-AF65-F5344CB8AC3E}">
+        <p14:creationId xmlns:p14="http://schemas.microsoft.com/office/powerpoint/2010/main" val="1990388660"/>
+      </p:ext>
+    </p:extLst>
+  </p:cSld>
+  <p:clrMapOvr>
+    <a:masterClrMapping/>
+  </p:clrMapOvr>
+  <mc:AlternateContent xmlns:mc="http://schemas.openxmlformats.org/markup-compatibility/2006" xmlns:p14="http://schemas.microsoft.com/office/powerpoint/2010/main">
+    <mc:Choice Requires="p14">
+      <p:transition p14:dur="0"/>
+    </mc:Choice>
+    <mc:Fallback xmlns="">
+      <p:transition/>
+    </mc:Fallback>
+  </mc:AlternateContent>
+  <p:timing>
+    <p:tnLst>
+      <p:par>
+        <p:cTn id="1" dur="indefinite" restart="never" nodeType="tmRoot"/>
+      </p:par>
+    </p:tnLst>
+  </p:timing>
+</p:sld>
+</file>
+
+<file path=ppt/slides/slide63.xml><?xml version="1.0" encoding="utf-8"?>
+<p:sld xmlns:a="http://schemas.openxmlformats.org/drawingml/2006/main" xmlns:r="http://schemas.openxmlformats.org/officeDocument/2006/relationships" xmlns:p="http://schemas.openxmlformats.org/presentationml/2006/main">
+  <p:cSld>
+    <p:spTree>
+      <p:nvGrpSpPr>
+        <p:cNvPr id="1" name=""/>
+        <p:cNvGrpSpPr/>
+        <p:nvPr/>
+      </p:nvGrpSpPr>
+      <p:grpSpPr>
+        <a:xfrm>
+          <a:off x="0" y="0"/>
+          <a:ext cx="0" cy="0"/>
+          <a:chOff x="0" y="0"/>
+          <a:chExt cx="0" cy="0"/>
+        </a:xfrm>
+      </p:grpSpPr>
+      <p:sp>
+        <p:nvSpPr>
+          <p:cNvPr id="2" name="Title 1"/>
+          <p:cNvSpPr>
+            <a:spLocks noGrp="1"/>
+          </p:cNvSpPr>
+          <p:nvPr>
+            <p:ph type="title"/>
+          </p:nvPr>
+        </p:nvSpPr>
+        <p:spPr/>
+        <p:txBody>
+          <a:bodyPr/>
+          <a:lstStyle/>
+          <a:p>
+            <a:r>
+              <a:rPr lang="en-US" dirty="0" smtClean="0"/>
+              <a:t>Homework (5)</a:t>
+            </a:r>
+            <a:endParaRPr lang="bg-BG" dirty="0"/>
+          </a:p>
+        </p:txBody>
+      </p:sp>
+      <p:sp>
+        <p:nvSpPr>
+          <p:cNvPr id="3" name="Content Placeholder 2"/>
+          <p:cNvSpPr>
+            <a:spLocks noGrp="1"/>
+          </p:cNvSpPr>
+          <p:nvPr>
+            <p:ph idx="1"/>
+          </p:nvPr>
+        </p:nvSpPr>
+        <p:spPr>
+          <a:xfrm>
+            <a:off x="228600" y="1143000"/>
+            <a:ext cx="8686800" cy="1295400"/>
+          </a:xfrm>
+        </p:spPr>
+        <p:txBody>
+          <a:bodyPr/>
+          <a:lstStyle/>
+          <a:p>
+            <a:pPr marL="514350" indent="-514350">
+              <a:buFont typeface="+mj-lt"/>
+              <a:buAutoNum type="arabicPeriod" startAt="2"/>
+            </a:pPr>
+            <a:r>
+              <a:rPr lang="en-US" sz="2800" dirty="0"/>
+              <a:t>Draw a </a:t>
+            </a:r>
+            <a:r>
+              <a:rPr lang="en-US" sz="2800" dirty="0" smtClean="0"/>
+              <a:t>circle that flies inside a box</a:t>
+            </a:r>
+          </a:p>
+          <a:p>
+            <a:pPr marL="712788" lvl="1" indent="-357188"/>
+            <a:r>
+              <a:rPr lang="en-US" sz="2600" dirty="0" smtClean="0"/>
+              <a:t>When it reaches an edge, it should bounce that edge</a:t>
+            </a:r>
+          </a:p>
+          <a:p>
+            <a:pPr marL="712788" lvl="1" indent="-357188"/>
+            <a:endParaRPr lang="bg-BG" dirty="0"/>
+          </a:p>
+        </p:txBody>
+      </p:sp>
+      <p:pic>
+        <p:nvPicPr>
+          <p:cNvPr id="45" name="Picture 44"/>
+          <p:cNvPicPr>
+            <a:picLocks noChangeAspect="1"/>
+          </p:cNvPicPr>
+          <p:nvPr/>
+        </p:nvPicPr>
+        <p:blipFill>
+          <a:blip r:embed="rId2"/>
+          <a:stretch>
+            <a:fillRect/>
+          </a:stretch>
+        </p:blipFill>
+        <p:spPr>
+          <a:xfrm>
+            <a:off x="1481060" y="2438400"/>
+            <a:ext cx="6181880" cy="3816427"/>
+          </a:xfrm>
+          <a:prstGeom prst="rect">
+            <a:avLst/>
+          </a:prstGeom>
+        </p:spPr>
+      </p:pic>
+    </p:spTree>
+    <p:extLst>
+      <p:ext uri="{BB962C8B-B14F-4D97-AF65-F5344CB8AC3E}">
+        <p14:creationId xmlns:p14="http://schemas.microsoft.com/office/powerpoint/2010/main" val="802043695"/>
+      </p:ext>
+    </p:extLst>
+  </p:cSld>
+  <p:clrMapOvr>
+    <a:masterClrMapping/>
+  </p:clrMapOvr>
+  <p:timing>
+    <p:tnLst>
+      <p:par>
+        <p:cTn id="1" dur="indefinite" restart="never" nodeType="tmRoot"/>
+      </p:par>
+    </p:tnLst>
+  </p:timing>
+</p:sld>
+</file>
+
+<file path=ppt/slides/slide64.xml><?xml version="1.0" encoding="utf-8"?>
+<p:sld xmlns:a="http://schemas.openxmlformats.org/drawingml/2006/main" xmlns:r="http://schemas.openxmlformats.org/officeDocument/2006/relationships" xmlns:p="http://schemas.openxmlformats.org/presentationml/2006/main">
+  <p:cSld>
+    <p:spTree>
+      <p:nvGrpSpPr>
+        <p:cNvPr id="1" name=""/>
+        <p:cNvGrpSpPr/>
+        <p:nvPr/>
+      </p:nvGrpSpPr>
+      <p:grpSpPr>
+        <a:xfrm>
+          <a:off x="0" y="0"/>
+          <a:ext cx="0" cy="0"/>
+          <a:chOff x="0" y="0"/>
+          <a:chExt cx="0" cy="0"/>
+        </a:xfrm>
+      </p:grpSpPr>
+      <p:sp>
+        <p:nvSpPr>
+          <p:cNvPr id="2" name="Title 1"/>
+          <p:cNvSpPr>
+            <a:spLocks noGrp="1"/>
+          </p:cNvSpPr>
+          <p:nvPr>
+            <p:ph type="title"/>
+          </p:nvPr>
+        </p:nvSpPr>
+        <p:spPr/>
+        <p:txBody>
+          <a:bodyPr/>
+          <a:lstStyle/>
+          <a:p>
+            <a:r>
+              <a:rPr lang="en-US" dirty="0" smtClean="0"/>
+              <a:t>Homework (7)</a:t>
+            </a:r>
+            <a:endParaRPr lang="bg-BG" dirty="0"/>
+          </a:p>
+        </p:txBody>
+      </p:sp>
+      <p:sp>
+        <p:nvSpPr>
+          <p:cNvPr id="3" name="Content Placeholder 2"/>
+          <p:cNvSpPr>
+            <a:spLocks noGrp="1"/>
+          </p:cNvSpPr>
+          <p:nvPr>
+            <p:ph idx="1"/>
+          </p:nvPr>
+        </p:nvSpPr>
+        <p:spPr/>
+        <p:txBody>
+          <a:bodyPr/>
+          <a:lstStyle/>
+          <a:p>
+            <a:pPr marL="514350" indent="-514350">
+              <a:lnSpc>
+                <a:spcPct val="100000"/>
+              </a:lnSpc>
+              <a:spcBef>
+                <a:spcPts val="300"/>
+              </a:spcBef>
+              <a:buFont typeface="+mj-lt"/>
+              <a:buAutoNum type="arabicPeriod" startAt="3"/>
+            </a:pPr>
+            <a:r>
+              <a:rPr lang="en-US" sz="2800" dirty="0" smtClean="0"/>
+              <a:t>*Create the famous game "Snake"</a:t>
+            </a:r>
+          </a:p>
+          <a:p>
+            <a:pPr marL="712788" lvl="1" indent="-357188">
+              <a:lnSpc>
+                <a:spcPct val="100000"/>
+              </a:lnSpc>
+              <a:spcBef>
+                <a:spcPts val="300"/>
+              </a:spcBef>
+            </a:pPr>
+            <a:r>
+              <a:rPr lang="en-US" dirty="0" smtClean="0"/>
+              <a:t>The snake is a sequence of rectangles/ellipses</a:t>
+            </a:r>
+          </a:p>
+          <a:p>
+            <a:pPr marL="712788" lvl="1" indent="-357188">
+              <a:lnSpc>
+                <a:spcPct val="100000"/>
+              </a:lnSpc>
+              <a:spcBef>
+                <a:spcPts val="300"/>
+              </a:spcBef>
+            </a:pPr>
+            <a:r>
+              <a:rPr lang="en-US" dirty="0" smtClean="0"/>
+              <a:t>The snake can move left, right, up or down</a:t>
+            </a:r>
+          </a:p>
+          <a:p>
+            <a:pPr marL="712788" lvl="1" indent="-357188">
+              <a:lnSpc>
+                <a:spcPct val="100000"/>
+              </a:lnSpc>
+              <a:spcBef>
+                <a:spcPts val="300"/>
+              </a:spcBef>
+            </a:pPr>
+            <a:r>
+              <a:rPr lang="en-US" dirty="0" smtClean="0"/>
+              <a:t>The snake dies if it reaches any of the edges or when it tries to eat itself</a:t>
+            </a:r>
+          </a:p>
+          <a:p>
+            <a:pPr marL="712788" lvl="1" indent="-357188">
+              <a:lnSpc>
+                <a:spcPct val="100000"/>
+              </a:lnSpc>
+              <a:spcBef>
+                <a:spcPts val="300"/>
+              </a:spcBef>
+            </a:pPr>
+            <a:r>
+              <a:rPr lang="en-US" dirty="0" smtClean="0"/>
+              <a:t>A food should be generated</a:t>
+            </a:r>
+          </a:p>
+          <a:p>
+            <a:pPr marL="1004888" lvl="2" indent="-357188">
+              <a:lnSpc>
+                <a:spcPct val="100000"/>
+              </a:lnSpc>
+              <a:spcBef>
+                <a:spcPts val="300"/>
+              </a:spcBef>
+            </a:pPr>
+            <a:r>
+              <a:rPr lang="en-US" dirty="0" smtClean="0"/>
+              <a:t>When the snake eats the food, it grows and new food is generated at random position</a:t>
+            </a:r>
+            <a:endParaRPr lang="en-US" dirty="0"/>
+          </a:p>
+          <a:p>
+            <a:pPr marL="712788" lvl="1" indent="-357188">
+              <a:lnSpc>
+                <a:spcPct val="100000"/>
+              </a:lnSpc>
+              <a:spcBef>
+                <a:spcPts val="300"/>
+              </a:spcBef>
+            </a:pPr>
+            <a:r>
+              <a:rPr lang="en-US" dirty="0" smtClean="0"/>
+              <a:t>Implement a high-score board, kept in </a:t>
+            </a:r>
+            <a:r>
+              <a:rPr lang="en-US" dirty="0" err="1" smtClean="0"/>
+              <a:t>localStorage</a:t>
+            </a:r>
+            <a:endParaRPr lang="en-US" dirty="0" smtClean="0"/>
+          </a:p>
+        </p:txBody>
+      </p:sp>
+    </p:spTree>
+    <p:extLst>
+      <p:ext uri="{BB962C8B-B14F-4D97-AF65-F5344CB8AC3E}">
+        <p14:creationId xmlns:p14="http://schemas.microsoft.com/office/powerpoint/2010/main" val="3819199288"/>
+      </p:ext>
+    </p:extLst>
+  </p:cSld>
+  <p:clrMapOvr>
+    <a:masterClrMapping/>
+  </p:clrMapOvr>
+  <p:timing>
+    <p:tnLst>
+      <p:par>
+        <p:cTn id="1" dur="indefinite" restart="never" nodeType="tmRoot"/>
+      </p:par>
+    </p:tnLst>
+  </p:timing>
+</p:sld>
+</file>
+
 <file path=ppt/slides/slide7.xml><?xml version="1.0" encoding="utf-8"?>
 <p:sld xmlns:a="http://schemas.openxmlformats.org/drawingml/2006/main" xmlns:r="http://schemas.openxmlformats.org/officeDocument/2006/relationships" xmlns:p="http://schemas.openxmlformats.org/presentationml/2006/main">
   <p:cSld>
@@ -26458,6 +28098,13 @@
   <p:clrMapOvr>
     <a:masterClrMapping/>
   </p:clrMapOvr>
+  <p:timing>
+    <p:tnLst>
+      <p:par>
+        <p:cTn id="1" dur="indefinite" restart="never" nodeType="tmRoot"/>
+      </p:par>
+    </p:tnLst>
+  </p:timing>
 </p:sld>
 </file>
 
@@ -26534,6 +28181,13 @@
   <p:clrMapOvr>
     <a:masterClrMapping/>
   </p:clrMapOvr>
+  <p:timing>
+    <p:tnLst>
+      <p:par>
+        <p:cTn id="1" dur="indefinite" restart="never" nodeType="tmRoot"/>
+      </p:par>
+    </p:tnLst>
+  </p:timing>
 </p:sld>
 </file>
 
@@ -26606,6 +28260,13 @@
   <p:clrMapOvr>
     <a:masterClrMapping/>
   </p:clrMapOvr>
+  <p:timing>
+    <p:tnLst>
+      <p:par>
+        <p:cTn id="1" dur="indefinite" restart="never" nodeType="tmRoot"/>
+      </p:par>
+    </p:tnLst>
+  </p:timing>
 </p:sld>
 </file>
 

</xml_diff>